<commit_message>
Imagenes de los Smells
</commit_message>
<xml_diff>
--- a/Diapositivas/Code Smells and Refactoring.pptx
+++ b/Diapositivas/Code Smells and Refactoring.pptx
@@ -5,7 +5,7 @@
     <p:sldMasterId id="2147483684" r:id="rId1"/>
   </p:sldMasterIdLst>
   <p:notesMasterIdLst>
-    <p:notesMasterId r:id="rId28"/>
+    <p:notesMasterId r:id="rId34"/>
   </p:notesMasterIdLst>
   <p:sldIdLst>
     <p:sldId id="321" r:id="rId2"/>
@@ -34,6 +34,12 @@
     <p:sldId id="344" r:id="rId25"/>
     <p:sldId id="710" r:id="rId26"/>
     <p:sldId id="705" r:id="rId27"/>
+    <p:sldId id="718" r:id="rId28"/>
+    <p:sldId id="719" r:id="rId29"/>
+    <p:sldId id="720" r:id="rId30"/>
+    <p:sldId id="721" r:id="rId31"/>
+    <p:sldId id="722" r:id="rId32"/>
+    <p:sldId id="723" r:id="rId33"/>
   </p:sldIdLst>
   <p:sldSz cx="9144000" cy="6858000" type="screen4x3"/>
   <p:notesSz cx="6858000" cy="9144000"/>
@@ -138,7 +144,7 @@
 
 <file path=ppt/commentAuthors.xml><?xml version="1.0" encoding="utf-8"?>
 <p:cmAuthorLst xmlns:a="http://schemas.openxmlformats.org/drawingml/2006/main" xmlns:r="http://schemas.openxmlformats.org/officeDocument/2006/relationships" xmlns:p="http://schemas.openxmlformats.org/presentationml/2006/main">
-  <p:cmAuthor id="0" name="Snahider" initials="S" lastIdx="4" clrIdx="0"/>
+  <p:cmAuthor id="0" name="Snahider" initials="S" lastIdx="5" clrIdx="0"/>
 </p:cmAuthorLst>
 </file>
 
@@ -147,6 +153,15 @@
   <p:cm authorId="0" dt="2012-10-30T02:25:38.882" idx="1">
     <p:pos x="10" y="10"/>
     <p:text>Texto Similar a IND</p:text>
+  </p:cm>
+</p:cmLst>
+</file>
+
+<file path=ppt/comments/comment2.xml><?xml version="1.0" encoding="utf-8"?>
+<p:cmLst xmlns:a="http://schemas.openxmlformats.org/drawingml/2006/main" xmlns:r="http://schemas.openxmlformats.org/officeDocument/2006/relationships" xmlns:p="http://schemas.openxmlformats.org/presentationml/2006/main">
+  <p:cm authorId="0" dt="2012-10-31T00:38:25.122" idx="5">
+    <p:pos x="10" y="10"/>
+    <p:text>Texto similar e imagen similar a ID</p:text>
   </p:cm>
 </p:cmLst>
 </file>
@@ -3038,7 +3053,7 @@
           <a:p>
             <a:fld id="{82731913-02B6-467D-B183-D787C0857BBF}" type="datetimeFigureOut">
               <a:rPr lang="es-PE" smtClean="0"/>
-              <a:t>10/11/2012</a:t>
+              <a:t>13/02/2013</a:t>
             </a:fld>
             <a:endParaRPr lang="es-PE"/>
           </a:p>
@@ -5352,7 +5367,7 @@
             <a:fld id="{807CB568-C05F-482F-9F26-AA302B8892DF}" type="datetimeFigureOut">
               <a:rPr lang="es-ES" smtClean="0"/>
               <a:pPr/>
-              <a:t>10/11/2012</a:t>
+              <a:t>13/02/2013</a:t>
             </a:fld>
             <a:endParaRPr lang="es-ES"/>
           </a:p>
@@ -5531,7 +5546,7 @@
             <a:fld id="{807CB568-C05F-482F-9F26-AA302B8892DF}" type="datetimeFigureOut">
               <a:rPr lang="es-ES" smtClean="0"/>
               <a:pPr/>
-              <a:t>10/11/2012</a:t>
+              <a:t>13/02/2013</a:t>
             </a:fld>
             <a:endParaRPr lang="es-ES"/>
           </a:p>
@@ -5720,7 +5735,7 @@
             <a:fld id="{807CB568-C05F-482F-9F26-AA302B8892DF}" type="datetimeFigureOut">
               <a:rPr lang="es-ES" smtClean="0"/>
               <a:pPr/>
-              <a:t>10/11/2012</a:t>
+              <a:t>13/02/2013</a:t>
             </a:fld>
             <a:endParaRPr lang="es-ES"/>
           </a:p>
@@ -5899,7 +5914,7 @@
             <a:fld id="{807CB568-C05F-482F-9F26-AA302B8892DF}" type="datetimeFigureOut">
               <a:rPr lang="es-ES" smtClean="0"/>
               <a:pPr/>
-              <a:t>10/11/2012</a:t>
+              <a:t>13/02/2013</a:t>
             </a:fld>
             <a:endParaRPr lang="es-ES"/>
           </a:p>
@@ -6154,7 +6169,7 @@
             <a:fld id="{807CB568-C05F-482F-9F26-AA302B8892DF}" type="datetimeFigureOut">
               <a:rPr lang="es-ES" smtClean="0"/>
               <a:pPr/>
-              <a:t>10/11/2012</a:t>
+              <a:t>13/02/2013</a:t>
             </a:fld>
             <a:endParaRPr lang="es-ES"/>
           </a:p>
@@ -6451,7 +6466,7 @@
             <a:fld id="{807CB568-C05F-482F-9F26-AA302B8892DF}" type="datetimeFigureOut">
               <a:rPr lang="es-ES" smtClean="0"/>
               <a:pPr/>
-              <a:t>10/11/2012</a:t>
+              <a:t>13/02/2013</a:t>
             </a:fld>
             <a:endParaRPr lang="es-ES"/>
           </a:p>
@@ -6882,7 +6897,7 @@
             <a:fld id="{807CB568-C05F-482F-9F26-AA302B8892DF}" type="datetimeFigureOut">
               <a:rPr lang="es-ES" smtClean="0"/>
               <a:pPr/>
-              <a:t>10/11/2012</a:t>
+              <a:t>13/02/2013</a:t>
             </a:fld>
             <a:endParaRPr lang="es-ES"/>
           </a:p>
@@ -7009,7 +7024,7 @@
             <a:fld id="{807CB568-C05F-482F-9F26-AA302B8892DF}" type="datetimeFigureOut">
               <a:rPr lang="es-ES" smtClean="0"/>
               <a:pPr/>
-              <a:t>10/11/2012</a:t>
+              <a:t>13/02/2013</a:t>
             </a:fld>
             <a:endParaRPr lang="es-ES"/>
           </a:p>
@@ -7113,7 +7128,7 @@
             <a:fld id="{807CB568-C05F-482F-9F26-AA302B8892DF}" type="datetimeFigureOut">
               <a:rPr lang="es-ES" smtClean="0"/>
               <a:pPr/>
-              <a:t>10/11/2012</a:t>
+              <a:t>13/02/2013</a:t>
             </a:fld>
             <a:endParaRPr lang="es-ES"/>
           </a:p>
@@ -7399,7 +7414,7 @@
             <a:fld id="{807CB568-C05F-482F-9F26-AA302B8892DF}" type="datetimeFigureOut">
               <a:rPr lang="es-ES" smtClean="0"/>
               <a:pPr/>
-              <a:t>10/11/2012</a:t>
+              <a:t>13/02/2013</a:t>
             </a:fld>
             <a:endParaRPr lang="es-ES"/>
           </a:p>
@@ -7668,7 +7683,7 @@
             <a:fld id="{807CB568-C05F-482F-9F26-AA302B8892DF}" type="datetimeFigureOut">
               <a:rPr lang="es-ES" smtClean="0"/>
               <a:pPr/>
-              <a:t>10/11/2012</a:t>
+              <a:t>13/02/2013</a:t>
             </a:fld>
             <a:endParaRPr lang="es-ES"/>
           </a:p>
@@ -7919,7 +7934,7 @@
             <a:fld id="{807CB568-C05F-482F-9F26-AA302B8892DF}" type="datetimeFigureOut">
               <a:rPr lang="es-ES" smtClean="0"/>
               <a:pPr/>
-              <a:t>10/11/2012</a:t>
+              <a:t>13/02/2013</a:t>
             </a:fld>
             <a:endParaRPr lang="es-ES"/>
           </a:p>
@@ -14549,6 +14564,344 @@
 </p:sld>
 </file>
 
+<file path=ppt/slides/slide27.xml><?xml version="1.0" encoding="utf-8"?>
+<p:sld xmlns:a="http://schemas.openxmlformats.org/drawingml/2006/main" xmlns:r="http://schemas.openxmlformats.org/officeDocument/2006/relationships" xmlns:p="http://schemas.openxmlformats.org/presentationml/2006/main">
+  <p:cSld>
+    <p:spTree>
+      <p:nvGrpSpPr>
+        <p:cNvPr id="1" name=""/>
+        <p:cNvGrpSpPr/>
+        <p:nvPr/>
+      </p:nvGrpSpPr>
+      <p:grpSpPr>
+        <a:xfrm>
+          <a:off x="0" y="0"/>
+          <a:ext cx="0" cy="0"/>
+          <a:chOff x="0" y="0"/>
+          <a:chExt cx="0" cy="0"/>
+        </a:xfrm>
+      </p:grpSpPr>
+      <p:sp>
+        <p:nvSpPr>
+          <p:cNvPr id="2" name="1 Título"/>
+          <p:cNvSpPr>
+            <a:spLocks noGrp="1"/>
+          </p:cNvSpPr>
+          <p:nvPr>
+            <p:ph type="title"/>
+          </p:nvPr>
+        </p:nvSpPr>
+        <p:spPr>
+          <a:xfrm>
+            <a:off x="457200" y="125760"/>
+            <a:ext cx="8229600" cy="1143000"/>
+          </a:xfrm>
+        </p:spPr>
+        <p:txBody>
+          <a:bodyPr/>
+          <a:lstStyle/>
+          <a:p>
+            <a:r>
+              <a:rPr lang="es-PE" dirty="0" smtClean="0">
+                <a:solidFill>
+                  <a:srgbClr val="FF0000"/>
+                </a:solidFill>
+              </a:rPr>
+              <a:t>Long </a:t>
+            </a:r>
+            <a:r>
+              <a:rPr lang="es-PE" dirty="0" err="1" smtClean="0">
+                <a:solidFill>
+                  <a:srgbClr val="FF0000"/>
+                </a:solidFill>
+              </a:rPr>
+              <a:t>Method</a:t>
+            </a:r>
+            <a:endParaRPr lang="es-PE" dirty="0">
+              <a:solidFill>
+                <a:srgbClr val="FF0000"/>
+              </a:solidFill>
+            </a:endParaRPr>
+          </a:p>
+        </p:txBody>
+      </p:sp>
+      <p:pic>
+        <p:nvPicPr>
+          <p:cNvPr id="4" name="3 Imagen"/>
+          <p:cNvPicPr>
+            <a:picLocks noChangeAspect="1"/>
+          </p:cNvPicPr>
+          <p:nvPr/>
+        </p:nvPicPr>
+        <p:blipFill rotWithShape="1">
+          <a:blip r:embed="rId2">
+            <a:extLst>
+              <a:ext uri="{28A0092B-C50C-407E-A947-70E740481C1C}">
+                <a14:useLocalDpi xmlns:a14="http://schemas.microsoft.com/office/drawing/2010/main" val="0"/>
+              </a:ext>
+            </a:extLst>
+          </a:blip>
+          <a:srcRect b="8895"/>
+          <a:stretch/>
+        </p:blipFill>
+        <p:spPr>
+          <a:xfrm>
+            <a:off x="3203848" y="1628800"/>
+            <a:ext cx="2743200" cy="3702482"/>
+          </a:xfrm>
+          <a:prstGeom prst="rect">
+            <a:avLst/>
+          </a:prstGeom>
+        </p:spPr>
+      </p:pic>
+    </p:spTree>
+    <p:extLst>
+      <p:ext uri="{BB962C8B-B14F-4D97-AF65-F5344CB8AC3E}">
+        <p14:creationId xmlns:p14="http://schemas.microsoft.com/office/powerpoint/2010/main" val="3276661375"/>
+      </p:ext>
+    </p:extLst>
+  </p:cSld>
+  <p:clrMapOvr>
+    <a:masterClrMapping/>
+  </p:clrMapOvr>
+  <p:timing>
+    <p:tnLst>
+      <p:par>
+        <p:cTn id="1" dur="indefinite" restart="never" nodeType="tmRoot"/>
+      </p:par>
+    </p:tnLst>
+  </p:timing>
+</p:sld>
+</file>
+
+<file path=ppt/slides/slide28.xml><?xml version="1.0" encoding="utf-8"?>
+<p:sld xmlns:a="http://schemas.openxmlformats.org/drawingml/2006/main" xmlns:r="http://schemas.openxmlformats.org/officeDocument/2006/relationships" xmlns:p="http://schemas.openxmlformats.org/presentationml/2006/main">
+  <p:cSld>
+    <p:spTree>
+      <p:nvGrpSpPr>
+        <p:cNvPr id="1" name=""/>
+        <p:cNvGrpSpPr/>
+        <p:nvPr/>
+      </p:nvGrpSpPr>
+      <p:grpSpPr>
+        <a:xfrm>
+          <a:off x="0" y="0"/>
+          <a:ext cx="0" cy="0"/>
+          <a:chOff x="0" y="0"/>
+          <a:chExt cx="0" cy="0"/>
+        </a:xfrm>
+      </p:grpSpPr>
+      <p:sp>
+        <p:nvSpPr>
+          <p:cNvPr id="2" name="1 Título"/>
+          <p:cNvSpPr>
+            <a:spLocks noGrp="1"/>
+          </p:cNvSpPr>
+          <p:nvPr>
+            <p:ph type="title"/>
+          </p:nvPr>
+        </p:nvSpPr>
+        <p:spPr/>
+        <p:txBody>
+          <a:bodyPr/>
+          <a:lstStyle/>
+          <a:p>
+            <a:r>
+              <a:rPr lang="es-PE" dirty="0" err="1" smtClean="0">
+                <a:solidFill>
+                  <a:srgbClr val="FF0000"/>
+                </a:solidFill>
+              </a:rPr>
+              <a:t>Duplicate</a:t>
+            </a:r>
+            <a:r>
+              <a:rPr lang="es-PE" dirty="0" smtClean="0">
+                <a:solidFill>
+                  <a:srgbClr val="FF0000"/>
+                </a:solidFill>
+              </a:rPr>
+              <a:t> </a:t>
+            </a:r>
+            <a:r>
+              <a:rPr lang="es-PE" dirty="0" err="1" smtClean="0">
+                <a:solidFill>
+                  <a:srgbClr val="FF0000"/>
+                </a:solidFill>
+              </a:rPr>
+              <a:t>Code</a:t>
+            </a:r>
+            <a:endParaRPr lang="es-PE" dirty="0">
+              <a:solidFill>
+                <a:srgbClr val="FF0000"/>
+              </a:solidFill>
+            </a:endParaRPr>
+          </a:p>
+        </p:txBody>
+      </p:sp>
+      <p:pic>
+        <p:nvPicPr>
+          <p:cNvPr id="7" name="6 Imagen"/>
+          <p:cNvPicPr>
+            <a:picLocks noChangeAspect="1"/>
+          </p:cNvPicPr>
+          <p:nvPr/>
+        </p:nvPicPr>
+        <p:blipFill>
+          <a:blip r:embed="rId2">
+            <a:extLst>
+              <a:ext uri="{28A0092B-C50C-407E-A947-70E740481C1C}">
+                <a14:useLocalDpi xmlns:a14="http://schemas.microsoft.com/office/drawing/2010/main" val="0"/>
+              </a:ext>
+            </a:extLst>
+          </a:blip>
+          <a:stretch>
+            <a:fillRect/>
+          </a:stretch>
+        </p:blipFill>
+        <p:spPr>
+          <a:xfrm>
+            <a:off x="2987824" y="2564904"/>
+            <a:ext cx="3397809" cy="2591739"/>
+          </a:xfrm>
+          <a:prstGeom prst="rect">
+            <a:avLst/>
+          </a:prstGeom>
+        </p:spPr>
+      </p:pic>
+    </p:spTree>
+    <p:extLst>
+      <p:ext uri="{BB962C8B-B14F-4D97-AF65-F5344CB8AC3E}">
+        <p14:creationId xmlns:p14="http://schemas.microsoft.com/office/powerpoint/2010/main" val="1142429973"/>
+      </p:ext>
+    </p:extLst>
+  </p:cSld>
+  <p:clrMapOvr>
+    <a:masterClrMapping/>
+  </p:clrMapOvr>
+  <p:timing>
+    <p:tnLst>
+      <p:par>
+        <p:cTn id="1" dur="indefinite" restart="never" nodeType="tmRoot"/>
+      </p:par>
+    </p:tnLst>
+  </p:timing>
+</p:sld>
+</file>
+
+<file path=ppt/slides/slide29.xml><?xml version="1.0" encoding="utf-8"?>
+<p:sld xmlns:a="http://schemas.openxmlformats.org/drawingml/2006/main" xmlns:r="http://schemas.openxmlformats.org/officeDocument/2006/relationships" xmlns:p="http://schemas.openxmlformats.org/presentationml/2006/main">
+  <p:cSld>
+    <p:spTree>
+      <p:nvGrpSpPr>
+        <p:cNvPr id="1" name=""/>
+        <p:cNvGrpSpPr/>
+        <p:nvPr/>
+      </p:nvGrpSpPr>
+      <p:grpSpPr>
+        <a:xfrm>
+          <a:off x="0" y="0"/>
+          <a:ext cx="0" cy="0"/>
+          <a:chOff x="0" y="0"/>
+          <a:chExt cx="0" cy="0"/>
+        </a:xfrm>
+      </p:grpSpPr>
+      <p:sp>
+        <p:nvSpPr>
+          <p:cNvPr id="2" name="1 Título"/>
+          <p:cNvSpPr>
+            <a:spLocks noGrp="1"/>
+          </p:cNvSpPr>
+          <p:nvPr>
+            <p:ph type="title"/>
+          </p:nvPr>
+        </p:nvSpPr>
+        <p:spPr/>
+        <p:txBody>
+          <a:bodyPr/>
+          <a:lstStyle/>
+          <a:p>
+            <a:r>
+              <a:rPr lang="es-PE" dirty="0" err="1">
+                <a:solidFill>
+                  <a:srgbClr val="FF0000"/>
+                </a:solidFill>
+              </a:rPr>
+              <a:t>Dead</a:t>
+            </a:r>
+            <a:r>
+              <a:rPr lang="es-PE" dirty="0">
+                <a:solidFill>
+                  <a:srgbClr val="009A46"/>
+                </a:solidFill>
+              </a:rPr>
+              <a:t> </a:t>
+            </a:r>
+            <a:r>
+              <a:rPr lang="es-PE" dirty="0" err="1">
+                <a:solidFill>
+                  <a:srgbClr val="FF0000"/>
+                </a:solidFill>
+              </a:rPr>
+              <a:t>Code</a:t>
+            </a:r>
+            <a:endParaRPr lang="es-PE" dirty="0">
+              <a:solidFill>
+                <a:srgbClr val="FF0000"/>
+              </a:solidFill>
+            </a:endParaRPr>
+          </a:p>
+        </p:txBody>
+      </p:sp>
+      <p:pic>
+        <p:nvPicPr>
+          <p:cNvPr id="5" name="4 Imagen"/>
+          <p:cNvPicPr>
+            <a:picLocks noChangeAspect="1"/>
+          </p:cNvPicPr>
+          <p:nvPr/>
+        </p:nvPicPr>
+        <p:blipFill>
+          <a:blip r:embed="rId2">
+            <a:extLst>
+              <a:ext uri="{28A0092B-C50C-407E-A947-70E740481C1C}">
+                <a14:useLocalDpi xmlns:a14="http://schemas.microsoft.com/office/drawing/2010/main" val="0"/>
+              </a:ext>
+            </a:extLst>
+          </a:blip>
+          <a:stretch>
+            <a:fillRect/>
+          </a:stretch>
+        </p:blipFill>
+        <p:spPr>
+          <a:xfrm>
+            <a:off x="3347864" y="1916832"/>
+            <a:ext cx="2444482" cy="3240360"/>
+          </a:xfrm>
+          <a:prstGeom prst="rect">
+            <a:avLst/>
+          </a:prstGeom>
+        </p:spPr>
+      </p:pic>
+    </p:spTree>
+    <p:extLst>
+      <p:ext uri="{BB962C8B-B14F-4D97-AF65-F5344CB8AC3E}">
+        <p14:creationId xmlns:p14="http://schemas.microsoft.com/office/powerpoint/2010/main" val="4237765569"/>
+      </p:ext>
+    </p:extLst>
+  </p:cSld>
+  <p:clrMapOvr>
+    <a:masterClrMapping/>
+  </p:clrMapOvr>
+  <p:timing>
+    <p:tnLst>
+      <p:par>
+        <p:cTn id="1" dur="indefinite" restart="never" nodeType="tmRoot"/>
+      </p:par>
+    </p:tnLst>
+  </p:timing>
+</p:sld>
+</file>
+
 <file path=ppt/slides/slide3.xml><?xml version="1.0" encoding="utf-8"?>
 <p:sld xmlns:a="http://schemas.openxmlformats.org/drawingml/2006/main" xmlns:r="http://schemas.openxmlformats.org/officeDocument/2006/relationships" xmlns:p="http://schemas.openxmlformats.org/presentationml/2006/main">
   <p:cSld>
@@ -14684,6 +15037,377 @@
     <p:extLst>
       <p:ext uri="{BB962C8B-B14F-4D97-AF65-F5344CB8AC3E}">
         <p14:creationId xmlns:p14="http://schemas.microsoft.com/office/powerpoint/2010/main" val="222094944"/>
+      </p:ext>
+    </p:extLst>
+  </p:cSld>
+  <p:clrMapOvr>
+    <a:masterClrMapping/>
+  </p:clrMapOvr>
+  <p:timing>
+    <p:tnLst>
+      <p:par>
+        <p:cTn id="1" dur="indefinite" restart="never" nodeType="tmRoot"/>
+      </p:par>
+    </p:tnLst>
+  </p:timing>
+</p:sld>
+</file>
+
+<file path=ppt/slides/slide30.xml><?xml version="1.0" encoding="utf-8"?>
+<p:sld xmlns:a="http://schemas.openxmlformats.org/drawingml/2006/main" xmlns:r="http://schemas.openxmlformats.org/officeDocument/2006/relationships" xmlns:p="http://schemas.openxmlformats.org/presentationml/2006/main">
+  <p:cSld>
+    <p:spTree>
+      <p:nvGrpSpPr>
+        <p:cNvPr id="1" name=""/>
+        <p:cNvGrpSpPr/>
+        <p:nvPr/>
+      </p:nvGrpSpPr>
+      <p:grpSpPr>
+        <a:xfrm>
+          <a:off x="0" y="0"/>
+          <a:ext cx="0" cy="0"/>
+          <a:chOff x="0" y="0"/>
+          <a:chExt cx="0" cy="0"/>
+        </a:xfrm>
+      </p:grpSpPr>
+      <p:sp>
+        <p:nvSpPr>
+          <p:cNvPr id="2" name="1 Título"/>
+          <p:cNvSpPr>
+            <a:spLocks noGrp="1"/>
+          </p:cNvSpPr>
+          <p:nvPr>
+            <p:ph type="title"/>
+          </p:nvPr>
+        </p:nvSpPr>
+        <p:spPr>
+          <a:xfrm>
+            <a:off x="457200" y="125760"/>
+            <a:ext cx="8229600" cy="1143000"/>
+          </a:xfrm>
+        </p:spPr>
+        <p:txBody>
+          <a:bodyPr/>
+          <a:lstStyle/>
+          <a:p>
+            <a:r>
+              <a:rPr lang="es-PE" dirty="0" smtClean="0">
+                <a:solidFill>
+                  <a:srgbClr val="FF0000"/>
+                </a:solidFill>
+              </a:rPr>
+              <a:t>Comentarios</a:t>
+            </a:r>
+            <a:endParaRPr lang="es-PE" dirty="0">
+              <a:solidFill>
+                <a:srgbClr val="FF0000"/>
+              </a:solidFill>
+            </a:endParaRPr>
+          </a:p>
+        </p:txBody>
+      </p:sp>
+      <p:pic>
+        <p:nvPicPr>
+          <p:cNvPr id="5" name="4 Imagen"/>
+          <p:cNvPicPr>
+            <a:picLocks noChangeAspect="1"/>
+          </p:cNvPicPr>
+          <p:nvPr/>
+        </p:nvPicPr>
+        <p:blipFill>
+          <a:blip r:embed="rId2">
+            <a:extLst>
+              <a:ext uri="{28A0092B-C50C-407E-A947-70E740481C1C}">
+                <a14:useLocalDpi xmlns:a14="http://schemas.microsoft.com/office/drawing/2010/main" val="0"/>
+              </a:ext>
+            </a:extLst>
+          </a:blip>
+          <a:stretch>
+            <a:fillRect/>
+          </a:stretch>
+        </p:blipFill>
+        <p:spPr>
+          <a:xfrm>
+            <a:off x="2195736" y="1761081"/>
+            <a:ext cx="4856463" cy="3252095"/>
+          </a:xfrm>
+          <a:prstGeom prst="rect">
+            <a:avLst/>
+          </a:prstGeom>
+        </p:spPr>
+      </p:pic>
+    </p:spTree>
+    <p:extLst>
+      <p:ext uri="{BB962C8B-B14F-4D97-AF65-F5344CB8AC3E}">
+        <p14:creationId xmlns:p14="http://schemas.microsoft.com/office/powerpoint/2010/main" val="2378485532"/>
+      </p:ext>
+    </p:extLst>
+  </p:cSld>
+  <p:clrMapOvr>
+    <a:masterClrMapping/>
+  </p:clrMapOvr>
+  <p:timing>
+    <p:tnLst>
+      <p:par>
+        <p:cTn id="1" dur="indefinite" restart="never" nodeType="tmRoot"/>
+      </p:par>
+    </p:tnLst>
+  </p:timing>
+</p:sld>
+</file>
+
+<file path=ppt/slides/slide31.xml><?xml version="1.0" encoding="utf-8"?>
+<p:sld xmlns:a="http://schemas.openxmlformats.org/drawingml/2006/main" xmlns:r="http://schemas.openxmlformats.org/officeDocument/2006/relationships" xmlns:p="http://schemas.openxmlformats.org/presentationml/2006/main">
+  <p:cSld>
+    <p:spTree>
+      <p:nvGrpSpPr>
+        <p:cNvPr id="1" name=""/>
+        <p:cNvGrpSpPr/>
+        <p:nvPr/>
+      </p:nvGrpSpPr>
+      <p:grpSpPr>
+        <a:xfrm>
+          <a:off x="0" y="0"/>
+          <a:ext cx="0" cy="0"/>
+          <a:chOff x="0" y="0"/>
+          <a:chExt cx="0" cy="0"/>
+        </a:xfrm>
+      </p:grpSpPr>
+      <p:sp>
+        <p:nvSpPr>
+          <p:cNvPr id="2" name="1 Título"/>
+          <p:cNvSpPr>
+            <a:spLocks noGrp="1"/>
+          </p:cNvSpPr>
+          <p:nvPr>
+            <p:ph type="title"/>
+          </p:nvPr>
+        </p:nvSpPr>
+        <p:spPr/>
+        <p:txBody>
+          <a:bodyPr/>
+          <a:lstStyle/>
+          <a:p>
+            <a:r>
+              <a:rPr lang="es-PE" dirty="0" err="1" smtClean="0">
+                <a:solidFill>
+                  <a:srgbClr val="FF0000"/>
+                </a:solidFill>
+              </a:rPr>
+              <a:t>Primitive</a:t>
+            </a:r>
+            <a:r>
+              <a:rPr lang="es-PE" dirty="0" smtClean="0">
+                <a:solidFill>
+                  <a:srgbClr val="FF0000"/>
+                </a:solidFill>
+              </a:rPr>
+              <a:t> </a:t>
+            </a:r>
+            <a:r>
+              <a:rPr lang="es-PE" dirty="0" err="1" smtClean="0">
+                <a:solidFill>
+                  <a:srgbClr val="FF0000"/>
+                </a:solidFill>
+              </a:rPr>
+              <a:t>Obsession</a:t>
+            </a:r>
+            <a:endParaRPr lang="es-PE" dirty="0">
+              <a:solidFill>
+                <a:srgbClr val="FF0000"/>
+              </a:solidFill>
+            </a:endParaRPr>
+          </a:p>
+        </p:txBody>
+      </p:sp>
+      <p:pic>
+        <p:nvPicPr>
+          <p:cNvPr id="2050" name="Picture 2"/>
+          <p:cNvPicPr>
+            <a:picLocks noChangeAspect="1" noChangeArrowheads="1"/>
+          </p:cNvPicPr>
+          <p:nvPr/>
+        </p:nvPicPr>
+        <p:blipFill>
+          <a:blip r:embed="rId2">
+            <a:extLst>
+              <a:ext uri="{28A0092B-C50C-407E-A947-70E740481C1C}">
+                <a14:useLocalDpi xmlns:a14="http://schemas.microsoft.com/office/drawing/2010/main" val="0"/>
+              </a:ext>
+            </a:extLst>
+          </a:blip>
+          <a:srcRect/>
+          <a:stretch>
+            <a:fillRect/>
+          </a:stretch>
+        </p:blipFill>
+        <p:spPr bwMode="auto">
+          <a:xfrm>
+            <a:off x="3131840" y="2132856"/>
+            <a:ext cx="3084562" cy="2914770"/>
+          </a:xfrm>
+          <a:prstGeom prst="rect">
+            <a:avLst/>
+          </a:prstGeom>
+          <a:ln>
+            <a:noFill/>
+          </a:ln>
+          <a:effectLst>
+            <a:softEdge rad="112500"/>
+          </a:effectLst>
+          <a:extLst>
+            <a:ext uri="{909E8E84-426E-40DD-AFC4-6F175D3DCCD1}">
+              <a14:hiddenFill xmlns:a14="http://schemas.microsoft.com/office/drawing/2010/main">
+                <a:solidFill>
+                  <a:schemeClr val="accent1"/>
+                </a:solidFill>
+              </a14:hiddenFill>
+            </a:ext>
+            <a:ext uri="{91240B29-F687-4F45-9708-019B960494DF}">
+              <a14:hiddenLine xmlns:a14="http://schemas.microsoft.com/office/drawing/2010/main" w="9525">
+                <a:solidFill>
+                  <a:schemeClr val="tx1"/>
+                </a:solidFill>
+                <a:miter lim="800000"/>
+                <a:headEnd/>
+                <a:tailEnd/>
+              </a14:hiddenLine>
+            </a:ext>
+            <a:ext uri="{AF507438-7753-43E0-B8FC-AC1667EBCBE1}">
+              <a14:hiddenEffects xmlns:a14="http://schemas.microsoft.com/office/drawing/2010/main">
+                <a:effectLst>
+                  <a:outerShdw dist="35921" dir="2700000" algn="ctr" rotWithShape="0">
+                    <a:schemeClr val="bg2"/>
+                  </a:outerShdw>
+                </a:effectLst>
+              </a14:hiddenEffects>
+            </a:ext>
+          </a:extLst>
+        </p:spPr>
+      </p:pic>
+    </p:spTree>
+    <p:extLst>
+      <p:ext uri="{BB962C8B-B14F-4D97-AF65-F5344CB8AC3E}">
+        <p14:creationId xmlns:p14="http://schemas.microsoft.com/office/powerpoint/2010/main" val="4184390931"/>
+      </p:ext>
+    </p:extLst>
+  </p:cSld>
+  <p:clrMapOvr>
+    <a:masterClrMapping/>
+  </p:clrMapOvr>
+  <p:timing>
+    <p:tnLst>
+      <p:par>
+        <p:cTn id="1" dur="indefinite" restart="never" nodeType="tmRoot"/>
+      </p:par>
+    </p:tnLst>
+  </p:timing>
+</p:sld>
+</file>
+
+<file path=ppt/slides/slide32.xml><?xml version="1.0" encoding="utf-8"?>
+<p:sld xmlns:a="http://schemas.openxmlformats.org/drawingml/2006/main" xmlns:r="http://schemas.openxmlformats.org/officeDocument/2006/relationships" xmlns:p="http://schemas.openxmlformats.org/presentationml/2006/main">
+  <p:cSld>
+    <p:spTree>
+      <p:nvGrpSpPr>
+        <p:cNvPr id="1" name=""/>
+        <p:cNvGrpSpPr/>
+        <p:nvPr/>
+      </p:nvGrpSpPr>
+      <p:grpSpPr>
+        <a:xfrm>
+          <a:off x="0" y="0"/>
+          <a:ext cx="0" cy="0"/>
+          <a:chOff x="0" y="0"/>
+          <a:chExt cx="0" cy="0"/>
+        </a:xfrm>
+      </p:grpSpPr>
+      <p:sp>
+        <p:nvSpPr>
+          <p:cNvPr id="2" name="1 Título"/>
+          <p:cNvSpPr>
+            <a:spLocks noGrp="1"/>
+          </p:cNvSpPr>
+          <p:nvPr>
+            <p:ph type="title"/>
+          </p:nvPr>
+        </p:nvSpPr>
+        <p:spPr>
+          <a:xfrm>
+            <a:off x="467544" y="332656"/>
+            <a:ext cx="8229600" cy="796951"/>
+          </a:xfrm>
+        </p:spPr>
+        <p:txBody>
+          <a:bodyPr/>
+          <a:lstStyle/>
+          <a:p>
+            <a:r>
+              <a:rPr lang="es-PE" dirty="0" err="1" smtClean="0">
+                <a:solidFill>
+                  <a:srgbClr val="FF0000"/>
+                </a:solidFill>
+              </a:rPr>
+              <a:t>Feature</a:t>
+            </a:r>
+            <a:r>
+              <a:rPr lang="es-PE" dirty="0" smtClean="0">
+                <a:solidFill>
+                  <a:srgbClr val="FF0000"/>
+                </a:solidFill>
+              </a:rPr>
+              <a:t> </a:t>
+            </a:r>
+            <a:r>
+              <a:rPr lang="es-PE" dirty="0" err="1" smtClean="0">
+                <a:solidFill>
+                  <a:srgbClr val="FF0000"/>
+                </a:solidFill>
+              </a:rPr>
+              <a:t>Envy</a:t>
+            </a:r>
+            <a:endParaRPr lang="es-PE" dirty="0">
+              <a:solidFill>
+                <a:srgbClr val="FF0000"/>
+              </a:solidFill>
+            </a:endParaRPr>
+          </a:p>
+        </p:txBody>
+      </p:sp>
+      <p:pic>
+        <p:nvPicPr>
+          <p:cNvPr id="3" name="2 Imagen"/>
+          <p:cNvPicPr>
+            <a:picLocks noChangeAspect="1"/>
+          </p:cNvPicPr>
+          <p:nvPr/>
+        </p:nvPicPr>
+        <p:blipFill>
+          <a:blip r:embed="rId2">
+            <a:extLst>
+              <a:ext uri="{28A0092B-C50C-407E-A947-70E740481C1C}">
+                <a14:useLocalDpi xmlns:a14="http://schemas.microsoft.com/office/drawing/2010/main" val="0"/>
+              </a:ext>
+            </a:extLst>
+          </a:blip>
+          <a:stretch>
+            <a:fillRect/>
+          </a:stretch>
+        </p:blipFill>
+        <p:spPr>
+          <a:xfrm>
+            <a:off x="2026060" y="1844824"/>
+            <a:ext cx="5112568" cy="3363921"/>
+          </a:xfrm>
+          <a:prstGeom prst="rect">
+            <a:avLst/>
+          </a:prstGeom>
+        </p:spPr>
+      </p:pic>
+    </p:spTree>
+    <p:extLst>
+      <p:ext uri="{BB962C8B-B14F-4D97-AF65-F5344CB8AC3E}">
+        <p14:creationId xmlns:p14="http://schemas.microsoft.com/office/powerpoint/2010/main" val="3282213096"/>
       </p:ext>
     </p:extLst>
   </p:cSld>

</xml_diff>

<commit_message>
Ejercicios: - Refuctoring - Inverse Refactoring
</commit_message>
<xml_diff>
--- a/Diapositivas/Code Smells and Refactoring.pptx
+++ b/Diapositivas/Code Smells and Refactoring.pptx
@@ -5,7 +5,7 @@
     <p:sldMasterId id="2147483684" r:id="rId1"/>
   </p:sldMasterIdLst>
   <p:notesMasterIdLst>
-    <p:notesMasterId r:id="rId56"/>
+    <p:notesMasterId r:id="rId58"/>
   </p:notesMasterIdLst>
   <p:sldIdLst>
     <p:sldId id="717" r:id="rId2"/>
@@ -55,13 +55,15 @@
     <p:sldId id="692" r:id="rId46"/>
     <p:sldId id="708" r:id="rId47"/>
     <p:sldId id="761" r:id="rId48"/>
-    <p:sldId id="762" r:id="rId49"/>
-    <p:sldId id="709" r:id="rId50"/>
-    <p:sldId id="342" r:id="rId51"/>
-    <p:sldId id="519" r:id="rId52"/>
+    <p:sldId id="709" r:id="rId49"/>
+    <p:sldId id="342" r:id="rId50"/>
+    <p:sldId id="519" r:id="rId51"/>
+    <p:sldId id="764" r:id="rId52"/>
     <p:sldId id="344" r:id="rId53"/>
-    <p:sldId id="710" r:id="rId54"/>
-    <p:sldId id="705" r:id="rId55"/>
+    <p:sldId id="762" r:id="rId54"/>
+    <p:sldId id="763" r:id="rId55"/>
+    <p:sldId id="710" r:id="rId56"/>
+    <p:sldId id="705" r:id="rId57"/>
   </p:sldIdLst>
   <p:sldSz cx="9144000" cy="6858000" type="screen4x3"/>
   <p:notesSz cx="6858000" cy="9144000"/>
@@ -2096,9 +2098,9 @@
     <dgm:cxn modelId="{9694F126-3ADB-43F5-85B1-5AB66EDBA53C}" srcId="{AA37C565-8227-47BE-938D-F0254EF29510}" destId="{2D629D79-084D-4FF9-8DF9-08F54FFF92DE}" srcOrd="0" destOrd="0" parTransId="{30A8A669-EA91-4A1E-9661-BB7D11EAB2EF}" sibTransId="{899BA343-E663-4062-B766-D4AB02F4C39C}"/>
     <dgm:cxn modelId="{F2AB151D-21B9-4D2B-A657-006D73F49BC8}" type="presOf" srcId="{9768ADBD-E274-445C-8DCD-B40B42EBD27B}" destId="{2CCF0EC0-5E87-4702-9012-7254A3821684}" srcOrd="0" destOrd="0" presId="urn:microsoft.com/office/officeart/2005/8/layout/cycle2"/>
     <dgm:cxn modelId="{4B86B7C8-E32E-4E93-BEB0-78CDA56678D2}" type="presOf" srcId="{76A1EA92-51E5-49EB-A181-D50B98697B05}" destId="{FB6A06C4-A2A0-4F93-829D-27E882A8B839}" srcOrd="0" destOrd="0" presId="urn:microsoft.com/office/officeart/2005/8/layout/cycle2"/>
-    <dgm:cxn modelId="{D7A616E2-9700-4CBA-9BBE-43444D8A6564}" type="presOf" srcId="{17CA2C55-0354-4402-9601-202C7F5A5539}" destId="{6552A34E-30A2-429F-881E-FE5C4BE2A18D}" srcOrd="1" destOrd="0" presId="urn:microsoft.com/office/officeart/2005/8/layout/cycle2"/>
     <dgm:cxn modelId="{1089786B-FC8F-44D2-845E-383202AFE628}" type="presOf" srcId="{3766CEFC-D74E-4FC6-B9BD-CE4F3847A8F1}" destId="{B4DAEDC5-1010-434A-AA93-DB22F5A7CB1E}" srcOrd="1" destOrd="0" presId="urn:microsoft.com/office/officeart/2005/8/layout/cycle2"/>
     <dgm:cxn modelId="{9E7B1AD0-4B2E-401B-B82A-F21921E14474}" srcId="{AA37C565-8227-47BE-938D-F0254EF29510}" destId="{7EB66F7D-EDF6-4CF9-8307-CDC396A315D2}" srcOrd="3" destOrd="0" parTransId="{1C435CE0-1330-4C41-B432-980635612D78}" sibTransId="{3766CEFC-D74E-4FC6-B9BD-CE4F3847A8F1}"/>
+    <dgm:cxn modelId="{D7A616E2-9700-4CBA-9BBE-43444D8A6564}" type="presOf" srcId="{17CA2C55-0354-4402-9601-202C7F5A5539}" destId="{6552A34E-30A2-429F-881E-FE5C4BE2A18D}" srcOrd="1" destOrd="0" presId="urn:microsoft.com/office/officeart/2005/8/layout/cycle2"/>
     <dgm:cxn modelId="{D953A32C-4D27-4AB5-8837-349E35D4EC32}" type="presOf" srcId="{86434053-B40A-4DA1-AC86-B95A2468B2D6}" destId="{B4181A90-3A21-4F79-83DB-5F7E138E1000}" srcOrd="0" destOrd="0" presId="urn:microsoft.com/office/officeart/2005/8/layout/cycle2"/>
     <dgm:cxn modelId="{9476F479-5E75-4A48-B836-A1328D3E5B65}" type="presOf" srcId="{2D629D79-084D-4FF9-8DF9-08F54FFF92DE}" destId="{8D88EC16-041F-468E-A4EE-B0C17C298D88}" srcOrd="0" destOrd="0" presId="urn:microsoft.com/office/officeart/2005/8/layout/cycle2"/>
     <dgm:cxn modelId="{E4C3E423-9E5F-4380-80CE-AA5DD2EC4561}" type="presOf" srcId="{17CA2C55-0354-4402-9601-202C7F5A5539}" destId="{19C3351F-DE4C-4425-8FAE-716FD4A6218E}" srcOrd="0" destOrd="0" presId="urn:microsoft.com/office/officeart/2005/8/layout/cycle2"/>
@@ -8284,10 +8286,6 @@
           <a:bodyPr/>
           <a:lstStyle/>
           <a:p>
-            <a:pPr marL="171450" indent="-171450">
-              <a:buFontTx/>
-              <a:buChar char="-"/>
-            </a:pPr>
             <a:endParaRPr lang="es-PE" dirty="0"/>
           </a:p>
         </p:txBody>
@@ -9210,6 +9208,210 @@
           <a:bodyPr/>
           <a:lstStyle/>
           <a:p>
+            <a:r>
+              <a:rPr lang="en-US" sz="1200" kern="1200" dirty="0" err="1" smtClean="0">
+                <a:solidFill>
+                  <a:schemeClr val="tx1"/>
+                </a:solidFill>
+                <a:effectLst/>
+                <a:latin typeface="+mn-lt"/>
+                <a:ea typeface="+mn-ea"/>
+                <a:cs typeface="+mn-cs"/>
+              </a:rPr>
+              <a:t>Otras</a:t>
+            </a:r>
+            <a:r>
+              <a:rPr lang="en-US" sz="1200" kern="1200" dirty="0" smtClean="0">
+                <a:solidFill>
+                  <a:schemeClr val="tx1"/>
+                </a:solidFill>
+                <a:effectLst/>
+                <a:latin typeface="+mn-lt"/>
+                <a:ea typeface="+mn-ea"/>
+                <a:cs typeface="+mn-cs"/>
+              </a:rPr>
+              <a:t> </a:t>
+            </a:r>
+            <a:r>
+              <a:rPr lang="en-US" sz="1200" kern="1200" dirty="0" err="1" smtClean="0">
+                <a:solidFill>
+                  <a:schemeClr val="tx1"/>
+                </a:solidFill>
+                <a:effectLst/>
+                <a:latin typeface="+mn-lt"/>
+                <a:ea typeface="+mn-ea"/>
+                <a:cs typeface="+mn-cs"/>
+              </a:rPr>
+              <a:t>reversiones</a:t>
+            </a:r>
+            <a:r>
+              <a:rPr lang="en-US" sz="1200" kern="1200" dirty="0" smtClean="0">
+                <a:solidFill>
+                  <a:schemeClr val="tx1"/>
+                </a:solidFill>
+                <a:effectLst/>
+                <a:latin typeface="+mn-lt"/>
+                <a:ea typeface="+mn-ea"/>
+                <a:cs typeface="+mn-cs"/>
+              </a:rPr>
+              <a:t>: </a:t>
+            </a:r>
+          </a:p>
+          <a:p>
+            <a:r>
+              <a:rPr lang="en-US" sz="1200" kern="1200" dirty="0" smtClean="0">
+                <a:solidFill>
+                  <a:schemeClr val="tx1"/>
+                </a:solidFill>
+                <a:effectLst/>
+                <a:latin typeface="+mn-lt"/>
+                <a:ea typeface="+mn-ea"/>
+                <a:cs typeface="+mn-cs"/>
+              </a:rPr>
+              <a:t>Hide Delegate</a:t>
+            </a:r>
+            <a:r>
+              <a:rPr lang="es-PE" sz="1200" kern="1200" baseline="0" dirty="0" smtClean="0">
+                <a:solidFill>
+                  <a:schemeClr val="tx1"/>
+                </a:solidFill>
+                <a:effectLst/>
+                <a:latin typeface="+mn-lt"/>
+                <a:ea typeface="+mn-ea"/>
+                <a:cs typeface="+mn-cs"/>
+              </a:rPr>
+              <a:t> - </a:t>
+            </a:r>
+            <a:r>
+              <a:rPr lang="en-US" sz="1200" kern="1200" dirty="0" smtClean="0">
+                <a:solidFill>
+                  <a:schemeClr val="tx1"/>
+                </a:solidFill>
+                <a:effectLst/>
+                <a:latin typeface="+mn-lt"/>
+                <a:ea typeface="+mn-ea"/>
+                <a:cs typeface="+mn-cs"/>
+              </a:rPr>
+              <a:t>Remove Middle Man</a:t>
+            </a:r>
+          </a:p>
+          <a:p>
+            <a:pPr marL="0" marR="0" indent="0" algn="l" defTabSz="914400" rtl="0" eaLnBrk="1" fontAlgn="auto" latinLnBrk="0" hangingPunct="1">
+              <a:lnSpc>
+                <a:spcPct val="100000"/>
+              </a:lnSpc>
+              <a:spcBef>
+                <a:spcPts val="0"/>
+              </a:spcBef>
+              <a:spcAft>
+                <a:spcPts val="0"/>
+              </a:spcAft>
+              <a:buClrTx/>
+              <a:buSzTx/>
+              <a:buFontTx/>
+              <a:buNone/>
+              <a:tabLst/>
+              <a:defRPr/>
+            </a:pPr>
+            <a:r>
+              <a:rPr lang="es-PE" sz="1200" kern="1200" dirty="0" err="1" smtClean="0">
+                <a:solidFill>
+                  <a:schemeClr val="tx1"/>
+                </a:solidFill>
+                <a:effectLst/>
+                <a:latin typeface="+mn-lt"/>
+                <a:ea typeface="+mn-ea"/>
+                <a:cs typeface="+mn-cs"/>
+              </a:rPr>
+              <a:t>Parameterize</a:t>
+            </a:r>
+            <a:r>
+              <a:rPr lang="es-PE" sz="1200" kern="1200" dirty="0" smtClean="0">
+                <a:solidFill>
+                  <a:schemeClr val="tx1"/>
+                </a:solidFill>
+                <a:effectLst/>
+                <a:latin typeface="+mn-lt"/>
+                <a:ea typeface="+mn-ea"/>
+                <a:cs typeface="+mn-cs"/>
+              </a:rPr>
+              <a:t> </a:t>
+            </a:r>
+            <a:r>
+              <a:rPr lang="es-PE" sz="1200" kern="1200" dirty="0" err="1" smtClean="0">
+                <a:solidFill>
+                  <a:schemeClr val="tx1"/>
+                </a:solidFill>
+                <a:effectLst/>
+                <a:latin typeface="+mn-lt"/>
+                <a:ea typeface="+mn-ea"/>
+                <a:cs typeface="+mn-cs"/>
+              </a:rPr>
+              <a:t>Method</a:t>
+            </a:r>
+            <a:r>
+              <a:rPr lang="es-PE" sz="1200" kern="1200" dirty="0" smtClean="0">
+                <a:solidFill>
+                  <a:schemeClr val="tx1"/>
+                </a:solidFill>
+                <a:effectLst/>
+                <a:latin typeface="+mn-lt"/>
+                <a:ea typeface="+mn-ea"/>
+                <a:cs typeface="+mn-cs"/>
+              </a:rPr>
+              <a:t> </a:t>
+            </a:r>
+            <a:r>
+              <a:rPr lang="en-US" sz="1200" kern="1200" dirty="0" smtClean="0">
+                <a:solidFill>
+                  <a:schemeClr val="tx1"/>
+                </a:solidFill>
+                <a:effectLst/>
+                <a:latin typeface="+mn-lt"/>
+                <a:ea typeface="+mn-ea"/>
+                <a:cs typeface="+mn-cs"/>
+              </a:rPr>
+              <a:t>-</a:t>
+            </a:r>
+            <a:r>
+              <a:rPr lang="en-US" sz="1200" kern="1200" baseline="0" dirty="0" smtClean="0">
+                <a:solidFill>
+                  <a:schemeClr val="tx1"/>
+                </a:solidFill>
+                <a:effectLst/>
+                <a:latin typeface="+mn-lt"/>
+                <a:ea typeface="+mn-ea"/>
+                <a:cs typeface="+mn-cs"/>
+              </a:rPr>
+              <a:t> </a:t>
+            </a:r>
+            <a:r>
+              <a:rPr lang="en-US" sz="1200" b="0" i="0" kern="1200" dirty="0" smtClean="0">
+                <a:solidFill>
+                  <a:schemeClr val="tx1"/>
+                </a:solidFill>
+                <a:effectLst/>
+                <a:latin typeface="+mn-lt"/>
+                <a:ea typeface="+mn-ea"/>
+                <a:cs typeface="+mn-cs"/>
+              </a:rPr>
+              <a:t>Replace Parameter with Explicit Methods</a:t>
+            </a:r>
+            <a:endParaRPr lang="es-PE" sz="1200" kern="1200" dirty="0" smtClean="0">
+              <a:solidFill>
+                <a:schemeClr val="tx1"/>
+              </a:solidFill>
+              <a:effectLst/>
+              <a:latin typeface="+mn-lt"/>
+              <a:ea typeface="+mn-ea"/>
+              <a:cs typeface="+mn-cs"/>
+            </a:endParaRPr>
+          </a:p>
+          <a:p>
+            <a:pPr marL="171450" indent="-171450">
+              <a:buFontTx/>
+              <a:buChar char="-"/>
+            </a:pPr>
             <a:endParaRPr lang="es-PE" dirty="0"/>
           </a:p>
         </p:txBody>
@@ -9232,6 +9434,189 @@
             <a:fld id="{80C14895-23C8-45AE-85D5-3B35E5980A68}" type="slidenum">
               <a:rPr lang="es-PE" smtClean="0"/>
               <a:t>53</a:t>
+            </a:fld>
+            <a:endParaRPr lang="es-PE"/>
+          </a:p>
+        </p:txBody>
+      </p:sp>
+    </p:spTree>
+    <p:extLst>
+      <p:ext uri="{BB962C8B-B14F-4D97-AF65-F5344CB8AC3E}">
+        <p14:creationId xmlns:p14="http://schemas.microsoft.com/office/powerpoint/2010/main" val="3432092158"/>
+      </p:ext>
+    </p:extLst>
+  </p:cSld>
+  <p:clrMapOvr>
+    <a:masterClrMapping/>
+  </p:clrMapOvr>
+</p:notes>
+</file>
+
+<file path=ppt/notesSlides/notesSlide31.xml><?xml version="1.0" encoding="utf-8"?>
+<p:notes xmlns:a="http://schemas.openxmlformats.org/drawingml/2006/main" xmlns:r="http://schemas.openxmlformats.org/officeDocument/2006/relationships" xmlns:p="http://schemas.openxmlformats.org/presentationml/2006/main">
+  <p:cSld>
+    <p:spTree>
+      <p:nvGrpSpPr>
+        <p:cNvPr id="1" name=""/>
+        <p:cNvGrpSpPr/>
+        <p:nvPr/>
+      </p:nvGrpSpPr>
+      <p:grpSpPr>
+        <a:xfrm>
+          <a:off x="0" y="0"/>
+          <a:ext cx="0" cy="0"/>
+          <a:chOff x="0" y="0"/>
+          <a:chExt cx="0" cy="0"/>
+        </a:xfrm>
+      </p:grpSpPr>
+      <p:sp>
+        <p:nvSpPr>
+          <p:cNvPr id="2" name="1 Marcador de imagen de diapositiva"/>
+          <p:cNvSpPr>
+            <a:spLocks noGrp="1" noRot="1" noChangeAspect="1"/>
+          </p:cNvSpPr>
+          <p:nvPr>
+            <p:ph type="sldImg"/>
+          </p:nvPr>
+        </p:nvSpPr>
+        <p:spPr/>
+      </p:sp>
+      <p:sp>
+        <p:nvSpPr>
+          <p:cNvPr id="3" name="2 Marcador de notas"/>
+          <p:cNvSpPr>
+            <a:spLocks noGrp="1"/>
+          </p:cNvSpPr>
+          <p:nvPr>
+            <p:ph type="body" idx="1"/>
+          </p:nvPr>
+        </p:nvSpPr>
+        <p:spPr/>
+        <p:txBody>
+          <a:bodyPr/>
+          <a:lstStyle/>
+          <a:p>
+            <a:r>
+              <a:rPr lang="es-PE" dirty="0" smtClean="0">
+                <a:hlinkClick r:id="rId3"/>
+              </a:rPr>
+              <a:t>http://www.youtube.com/watch?v=7RJmoCWx4cE</a:t>
+            </a:r>
+            <a:endParaRPr lang="es-PE" dirty="0" smtClean="0"/>
+          </a:p>
+          <a:p>
+            <a:r>
+              <a:rPr lang="es-PE" dirty="0" smtClean="0">
+                <a:hlinkClick r:id="rId4"/>
+              </a:rPr>
+              <a:t>http://www.youtube.com/watch?v=5fd-hpjeg9c</a:t>
+            </a:r>
+            <a:endParaRPr lang="es-PE" dirty="0"/>
+          </a:p>
+        </p:txBody>
+      </p:sp>
+      <p:sp>
+        <p:nvSpPr>
+          <p:cNvPr id="4" name="3 Marcador de número de diapositiva"/>
+          <p:cNvSpPr>
+            <a:spLocks noGrp="1"/>
+          </p:cNvSpPr>
+          <p:nvPr>
+            <p:ph type="sldNum" sz="quarter" idx="10"/>
+          </p:nvPr>
+        </p:nvSpPr>
+        <p:spPr/>
+        <p:txBody>
+          <a:bodyPr/>
+          <a:lstStyle/>
+          <a:p>
+            <a:fld id="{80C14895-23C8-45AE-85D5-3B35E5980A68}" type="slidenum">
+              <a:rPr lang="es-PE" smtClean="0"/>
+              <a:t>54</a:t>
+            </a:fld>
+            <a:endParaRPr lang="es-PE"/>
+          </a:p>
+        </p:txBody>
+      </p:sp>
+    </p:spTree>
+    <p:extLst>
+      <p:ext uri="{BB962C8B-B14F-4D97-AF65-F5344CB8AC3E}">
+        <p14:creationId xmlns:p14="http://schemas.microsoft.com/office/powerpoint/2010/main" val="3432092158"/>
+      </p:ext>
+    </p:extLst>
+  </p:cSld>
+  <p:clrMapOvr>
+    <a:masterClrMapping/>
+  </p:clrMapOvr>
+</p:notes>
+</file>
+
+<file path=ppt/notesSlides/notesSlide32.xml><?xml version="1.0" encoding="utf-8"?>
+<p:notes xmlns:a="http://schemas.openxmlformats.org/drawingml/2006/main" xmlns:r="http://schemas.openxmlformats.org/officeDocument/2006/relationships" xmlns:p="http://schemas.openxmlformats.org/presentationml/2006/main">
+  <p:cSld>
+    <p:spTree>
+      <p:nvGrpSpPr>
+        <p:cNvPr id="1" name=""/>
+        <p:cNvGrpSpPr/>
+        <p:nvPr/>
+      </p:nvGrpSpPr>
+      <p:grpSpPr>
+        <a:xfrm>
+          <a:off x="0" y="0"/>
+          <a:ext cx="0" cy="0"/>
+          <a:chOff x="0" y="0"/>
+          <a:chExt cx="0" cy="0"/>
+        </a:xfrm>
+      </p:grpSpPr>
+      <p:sp>
+        <p:nvSpPr>
+          <p:cNvPr id="2" name="1 Marcador de imagen de diapositiva"/>
+          <p:cNvSpPr>
+            <a:spLocks noGrp="1" noRot="1" noChangeAspect="1"/>
+          </p:cNvSpPr>
+          <p:nvPr>
+            <p:ph type="sldImg"/>
+          </p:nvPr>
+        </p:nvSpPr>
+        <p:spPr/>
+      </p:sp>
+      <p:sp>
+        <p:nvSpPr>
+          <p:cNvPr id="3" name="2 Marcador de notas"/>
+          <p:cNvSpPr>
+            <a:spLocks noGrp="1"/>
+          </p:cNvSpPr>
+          <p:nvPr>
+            <p:ph type="body" idx="1"/>
+          </p:nvPr>
+        </p:nvSpPr>
+        <p:spPr/>
+        <p:txBody>
+          <a:bodyPr/>
+          <a:lstStyle/>
+          <a:p>
+            <a:endParaRPr lang="es-PE" dirty="0"/>
+          </a:p>
+        </p:txBody>
+      </p:sp>
+      <p:sp>
+        <p:nvSpPr>
+          <p:cNvPr id="4" name="3 Marcador de número de diapositiva"/>
+          <p:cNvSpPr>
+            <a:spLocks noGrp="1"/>
+          </p:cNvSpPr>
+          <p:nvPr>
+            <p:ph type="sldNum" sz="quarter" idx="10"/>
+          </p:nvPr>
+        </p:nvSpPr>
+        <p:spPr/>
+        <p:txBody>
+          <a:bodyPr/>
+          <a:lstStyle/>
+          <a:p>
+            <a:fld id="{80C14895-23C8-45AE-85D5-3B35E5980A68}" type="slidenum">
+              <a:rPr lang="es-PE" smtClean="0"/>
+              <a:t>55</a:t>
             </a:fld>
             <a:endParaRPr lang="es-PE"/>
           </a:p>
@@ -16202,10 +16587,6 @@
               <a:rPr lang="es-PE" sz="2400" dirty="0" smtClean="0"/>
               <a:t>Se mostrará imágenes con analogías que representen a los </a:t>
             </a:r>
-            <a:r>
-              <a:rPr lang="es-PE" sz="2400" dirty="0" smtClean="0"/>
-              <a:t/>
-            </a:r>
             <a:br>
               <a:rPr lang="es-PE" sz="2400" dirty="0" smtClean="0"/>
             </a:br>
@@ -16240,15 +16621,7 @@
             </a:pPr>
             <a:r>
               <a:rPr lang="es-PE" sz="2400" dirty="0" smtClean="0"/>
-              <a:t>Identificar </a:t>
-            </a:r>
-            <a:r>
-              <a:rPr lang="es-PE" sz="2400" dirty="0" smtClean="0"/>
-              <a:t>entre todos de </a:t>
-            </a:r>
-            <a:r>
-              <a:rPr lang="es-PE" sz="2400" dirty="0" smtClean="0"/>
-              <a:t>qué </a:t>
+              <a:t>Identificar entre todos de qué </a:t>
             </a:r>
             <a:r>
               <a:rPr lang="es-PE" sz="2400" dirty="0" err="1" smtClean="0"/>
@@ -19730,11 +20103,7 @@
             </a:pPr>
             <a:r>
               <a:rPr lang="es-PE" sz="2400" dirty="0" smtClean="0"/>
-              <a:t>Identificar dentro del </a:t>
-            </a:r>
-            <a:r>
-              <a:rPr lang="es-PE" sz="2400" dirty="0" smtClean="0"/>
-              <a:t>código todos los </a:t>
+              <a:t>Identificar dentro del código todos los </a:t>
             </a:r>
             <a:r>
               <a:rPr lang="es-PE" sz="2400" dirty="0" err="1" smtClean="0"/>
@@ -20095,7 +20464,6 @@
               <a:rPr lang="es-PE" sz="2400" dirty="0" smtClean="0"/>
               <a:t>.</a:t>
             </a:r>
-            <a:endParaRPr lang="es-PE" sz="2400" dirty="0" smtClean="0"/>
           </a:p>
           <a:p>
             <a:pPr marL="285750" indent="-285750">
@@ -20137,7 +20505,6 @@
               <a:rPr lang="es-PE" sz="2400" dirty="0" smtClean="0"/>
               <a:t>cree que se encuentra ahí.</a:t>
             </a:r>
-            <a:endParaRPr lang="es-PE" sz="2400" dirty="0" smtClean="0"/>
           </a:p>
         </p:txBody>
       </p:sp>
@@ -21873,15 +22240,7 @@
             </a:pPr>
             <a:r>
               <a:rPr lang="es-PE" sz="2400" dirty="0" smtClean="0"/>
-              <a:t>A cada </a:t>
-            </a:r>
-            <a:r>
-              <a:rPr lang="es-PE" sz="2400" dirty="0" smtClean="0"/>
-              <a:t>persona </a:t>
-            </a:r>
-            <a:r>
-              <a:rPr lang="es-PE" sz="2400" dirty="0" smtClean="0"/>
-              <a:t>se le ha entregado un catálogo de </a:t>
+              <a:t>A cada persona se le ha entregado un catálogo de </a:t>
             </a:r>
             <a:r>
               <a:rPr lang="es-PE" sz="2400" dirty="0" err="1" smtClean="0"/>
@@ -21924,11 +22283,7 @@
             </a:r>
             <a:r>
               <a:rPr lang="es-PE" sz="2400" dirty="0" smtClean="0"/>
-              <a:t> de ese catálogo solucionarían </a:t>
-            </a:r>
-            <a:r>
-              <a:rPr lang="es-PE" sz="2400" dirty="0" smtClean="0"/>
-              <a:t>cada uno de todos los </a:t>
+              <a:t> de ese catálogo solucionarían cada uno de todos los </a:t>
             </a:r>
             <a:r>
               <a:rPr lang="es-PE" sz="2400" dirty="0" err="1" smtClean="0"/>
@@ -22272,358 +22627,6 @@
 </file>
 
 <file path=ppt/slides/slide48.xml><?xml version="1.0" encoding="utf-8"?>
-<p:sld xmlns:a="http://schemas.openxmlformats.org/drawingml/2006/main" xmlns:r="http://schemas.openxmlformats.org/officeDocument/2006/relationships" xmlns:p="http://schemas.openxmlformats.org/presentationml/2006/main">
-  <p:cSld>
-    <p:spTree>
-      <p:nvGrpSpPr>
-        <p:cNvPr id="1" name=""/>
-        <p:cNvGrpSpPr/>
-        <p:nvPr/>
-      </p:nvGrpSpPr>
-      <p:grpSpPr>
-        <a:xfrm>
-          <a:off x="0" y="0"/>
-          <a:ext cx="0" cy="0"/>
-          <a:chOff x="0" y="0"/>
-          <a:chExt cx="0" cy="0"/>
-        </a:xfrm>
-      </p:grpSpPr>
-      <p:sp>
-        <p:nvSpPr>
-          <p:cNvPr id="5" name="4 CuadroTexto"/>
-          <p:cNvSpPr txBox="1"/>
-          <p:nvPr/>
-        </p:nvSpPr>
-        <p:spPr>
-          <a:xfrm>
-            <a:off x="863589" y="3083476"/>
-            <a:ext cx="7416823" cy="1569660"/>
-          </a:xfrm>
-          <a:prstGeom prst="rect">
-            <a:avLst/>
-          </a:prstGeom>
-          <a:noFill/>
-        </p:spPr>
-        <p:txBody>
-          <a:bodyPr wrap="square" rtlCol="0">
-            <a:spAutoFit/>
-          </a:bodyPr>
-          <a:lstStyle/>
-          <a:p>
-            <a:pPr marL="285750" indent="-285750">
-              <a:buFont typeface="Arial" pitchFamily="34" charset="0"/>
-              <a:buChar char="•"/>
-            </a:pPr>
-            <a:r>
-              <a:rPr lang="es-PE" sz="2400" dirty="0" smtClean="0"/>
-              <a:t>Uno a uno nombraremos cada </a:t>
-            </a:r>
-            <a:r>
-              <a:rPr lang="es-PE" sz="2400" dirty="0" err="1" smtClean="0"/>
-              <a:t>Code</a:t>
-            </a:r>
-            <a:r>
-              <a:rPr lang="es-PE" sz="2400" dirty="0" smtClean="0"/>
-              <a:t> </a:t>
-            </a:r>
-            <a:r>
-              <a:rPr lang="es-PE" sz="2400" dirty="0" err="1" smtClean="0"/>
-              <a:t>Smell</a:t>
-            </a:r>
-            <a:r>
-              <a:rPr lang="es-PE" sz="2400" dirty="0" smtClean="0"/>
-              <a:t>.</a:t>
-            </a:r>
-            <a:endParaRPr lang="es-PE" sz="2400" dirty="0" smtClean="0"/>
-          </a:p>
-          <a:p>
-            <a:pPr marL="285750" indent="-285750">
-              <a:buFont typeface="Arial" pitchFamily="34" charset="0"/>
-              <a:buChar char="•"/>
-            </a:pPr>
-            <a:endParaRPr lang="es-PE" sz="2400" dirty="0" smtClean="0"/>
-          </a:p>
-          <a:p>
-            <a:pPr marL="285750" indent="-285750">
-              <a:buFont typeface="Arial" pitchFamily="34" charset="0"/>
-              <a:buChar char="•"/>
-            </a:pPr>
-            <a:r>
-              <a:rPr lang="es-PE" sz="2400" dirty="0" smtClean="0"/>
-              <a:t>Cualquier persona se levanta, explica al resto cuál es el </a:t>
-            </a:r>
-            <a:r>
-              <a:rPr lang="es-PE" sz="2400" dirty="0"/>
-              <a:t>R</a:t>
-            </a:r>
-            <a:r>
-              <a:rPr lang="es-PE" sz="2400" dirty="0" smtClean="0"/>
-              <a:t>efactoring que aplicaría para solucionar ese </a:t>
-            </a:r>
-            <a:r>
-              <a:rPr lang="es-PE" sz="2400" dirty="0" err="1" smtClean="0"/>
-              <a:t>Smell</a:t>
-            </a:r>
-            <a:r>
-              <a:rPr lang="es-PE" sz="2400" dirty="0" smtClean="0"/>
-              <a:t>.</a:t>
-            </a:r>
-            <a:endParaRPr lang="es-PE" sz="2400" dirty="0" smtClean="0"/>
-          </a:p>
-        </p:txBody>
-      </p:sp>
-      <p:sp>
-        <p:nvSpPr>
-          <p:cNvPr id="6" name="2 Título"/>
-          <p:cNvSpPr txBox="1">
-            <a:spLocks/>
-          </p:cNvSpPr>
-          <p:nvPr/>
-        </p:nvSpPr>
-        <p:spPr bwMode="auto">
-          <a:xfrm>
-            <a:off x="446856" y="648564"/>
-            <a:ext cx="8229600" cy="2088232"/>
-          </a:xfrm>
-          <a:prstGeom prst="rect">
-            <a:avLst/>
-          </a:prstGeom>
-          <a:noFill/>
-          <a:ln w="9525">
-            <a:noFill/>
-            <a:miter lim="800000"/>
-            <a:headEnd/>
-            <a:tailEnd/>
-          </a:ln>
-        </p:spPr>
-        <p:txBody>
-          <a:bodyPr vert="horz" wrap="square" lIns="91440" tIns="45720" rIns="91440" bIns="45720" numCol="1" anchor="ctr" anchorCtr="0" compatLnSpc="1">
-            <a:prstTxWarp prst="textNoShape">
-              <a:avLst/>
-            </a:prstTxWarp>
-          </a:bodyPr>
-          <a:lstStyle>
-            <a:lvl1pPr algn="ctr" rtl="0" eaLnBrk="1" fontAlgn="base" hangingPunct="1">
-              <a:spcBef>
-                <a:spcPct val="0"/>
-              </a:spcBef>
-              <a:spcAft>
-                <a:spcPct val="0"/>
-              </a:spcAft>
-              <a:defRPr sz="4400" kern="1200">
-                <a:solidFill>
-                  <a:schemeClr val="tx1"/>
-                </a:solidFill>
-                <a:latin typeface="+mj-lt"/>
-                <a:ea typeface="+mj-ea"/>
-                <a:cs typeface="+mj-cs"/>
-              </a:defRPr>
-            </a:lvl1pPr>
-            <a:lvl2pPr algn="ctr" rtl="0" eaLnBrk="1" fontAlgn="base" hangingPunct="1">
-              <a:spcBef>
-                <a:spcPct val="0"/>
-              </a:spcBef>
-              <a:spcAft>
-                <a:spcPct val="0"/>
-              </a:spcAft>
-              <a:defRPr sz="4400">
-                <a:solidFill>
-                  <a:schemeClr val="tx1"/>
-                </a:solidFill>
-                <a:latin typeface="Calibri" pitchFamily="34" charset="0"/>
-              </a:defRPr>
-            </a:lvl2pPr>
-            <a:lvl3pPr algn="ctr" rtl="0" eaLnBrk="1" fontAlgn="base" hangingPunct="1">
-              <a:spcBef>
-                <a:spcPct val="0"/>
-              </a:spcBef>
-              <a:spcAft>
-                <a:spcPct val="0"/>
-              </a:spcAft>
-              <a:defRPr sz="4400">
-                <a:solidFill>
-                  <a:schemeClr val="tx1"/>
-                </a:solidFill>
-                <a:latin typeface="Calibri" pitchFamily="34" charset="0"/>
-              </a:defRPr>
-            </a:lvl3pPr>
-            <a:lvl4pPr algn="ctr" rtl="0" eaLnBrk="1" fontAlgn="base" hangingPunct="1">
-              <a:spcBef>
-                <a:spcPct val="0"/>
-              </a:spcBef>
-              <a:spcAft>
-                <a:spcPct val="0"/>
-              </a:spcAft>
-              <a:defRPr sz="4400">
-                <a:solidFill>
-                  <a:schemeClr val="tx1"/>
-                </a:solidFill>
-                <a:latin typeface="Calibri" pitchFamily="34" charset="0"/>
-              </a:defRPr>
-            </a:lvl4pPr>
-            <a:lvl5pPr algn="ctr" rtl="0" eaLnBrk="1" fontAlgn="base" hangingPunct="1">
-              <a:spcBef>
-                <a:spcPct val="0"/>
-              </a:spcBef>
-              <a:spcAft>
-                <a:spcPct val="0"/>
-              </a:spcAft>
-              <a:defRPr sz="4400">
-                <a:solidFill>
-                  <a:schemeClr val="tx1"/>
-                </a:solidFill>
-                <a:latin typeface="Calibri" pitchFamily="34" charset="0"/>
-              </a:defRPr>
-            </a:lvl5pPr>
-            <a:lvl6pPr marL="457200" algn="ctr" rtl="0" eaLnBrk="1" fontAlgn="base" hangingPunct="1">
-              <a:spcBef>
-                <a:spcPct val="0"/>
-              </a:spcBef>
-              <a:spcAft>
-                <a:spcPct val="0"/>
-              </a:spcAft>
-              <a:defRPr sz="4400">
-                <a:solidFill>
-                  <a:schemeClr val="tx1"/>
-                </a:solidFill>
-                <a:latin typeface="Calibri" pitchFamily="34" charset="0"/>
-              </a:defRPr>
-            </a:lvl6pPr>
-            <a:lvl7pPr marL="914400" algn="ctr" rtl="0" eaLnBrk="1" fontAlgn="base" hangingPunct="1">
-              <a:spcBef>
-                <a:spcPct val="0"/>
-              </a:spcBef>
-              <a:spcAft>
-                <a:spcPct val="0"/>
-              </a:spcAft>
-              <a:defRPr sz="4400">
-                <a:solidFill>
-                  <a:schemeClr val="tx1"/>
-                </a:solidFill>
-                <a:latin typeface="Calibri" pitchFamily="34" charset="0"/>
-              </a:defRPr>
-            </a:lvl7pPr>
-            <a:lvl8pPr marL="1371600" algn="ctr" rtl="0" eaLnBrk="1" fontAlgn="base" hangingPunct="1">
-              <a:spcBef>
-                <a:spcPct val="0"/>
-              </a:spcBef>
-              <a:spcAft>
-                <a:spcPct val="0"/>
-              </a:spcAft>
-              <a:defRPr sz="4400">
-                <a:solidFill>
-                  <a:schemeClr val="tx1"/>
-                </a:solidFill>
-                <a:latin typeface="Calibri" pitchFamily="34" charset="0"/>
-              </a:defRPr>
-            </a:lvl8pPr>
-            <a:lvl9pPr marL="1828800" algn="ctr" rtl="0" eaLnBrk="1" fontAlgn="base" hangingPunct="1">
-              <a:spcBef>
-                <a:spcPct val="0"/>
-              </a:spcBef>
-              <a:spcAft>
-                <a:spcPct val="0"/>
-              </a:spcAft>
-              <a:defRPr sz="4400">
-                <a:solidFill>
-                  <a:schemeClr val="tx1"/>
-                </a:solidFill>
-                <a:latin typeface="Calibri" pitchFamily="34" charset="0"/>
-              </a:defRPr>
-            </a:lvl9pPr>
-          </a:lstStyle>
-          <a:p>
-            <a:r>
-              <a:rPr lang="es-PE" dirty="0" smtClean="0">
-                <a:solidFill>
-                  <a:srgbClr val="FFC000"/>
-                </a:solidFill>
-              </a:rPr>
-              <a:t>Ejercicio </a:t>
-            </a:r>
-            <a:r>
-              <a:rPr lang="es-PE" dirty="0" smtClean="0">
-                <a:solidFill>
-                  <a:srgbClr val="00823B"/>
-                </a:solidFill>
-              </a:rPr>
-              <a:t/>
-            </a:r>
-            <a:br>
-              <a:rPr lang="es-PE" dirty="0" smtClean="0">
-                <a:solidFill>
-                  <a:srgbClr val="00823B"/>
-                </a:solidFill>
-              </a:rPr>
-            </a:br>
-            <a:r>
-              <a:rPr lang="es-PE" dirty="0" smtClean="0">
-                <a:solidFill>
-                  <a:srgbClr val="00823B"/>
-                </a:solidFill>
-              </a:rPr>
-              <a:t>Identificando </a:t>
-            </a:r>
-            <a:r>
-              <a:rPr lang="es-PE" dirty="0" err="1" smtClean="0">
-                <a:solidFill>
-                  <a:srgbClr val="00823B"/>
-                </a:solidFill>
-              </a:rPr>
-              <a:t>Refactorings</a:t>
-            </a:r>
-            <a:r>
-              <a:rPr lang="es-PE" dirty="0" smtClean="0">
-                <a:solidFill>
-                  <a:srgbClr val="00823B"/>
-                </a:solidFill>
-              </a:rPr>
-              <a:t/>
-            </a:r>
-            <a:br>
-              <a:rPr lang="es-PE" dirty="0" smtClean="0">
-                <a:solidFill>
-                  <a:srgbClr val="00823B"/>
-                </a:solidFill>
-              </a:rPr>
-            </a:br>
-            <a:r>
-              <a:rPr lang="es-PE" dirty="0" smtClean="0">
-                <a:solidFill>
-                  <a:srgbClr val="00823B"/>
-                </a:solidFill>
-              </a:rPr>
-              <a:t>dentro del código.</a:t>
-            </a:r>
-            <a:endParaRPr lang="es-PE" dirty="0">
-              <a:solidFill>
-                <a:srgbClr val="00823B"/>
-              </a:solidFill>
-            </a:endParaRPr>
-          </a:p>
-        </p:txBody>
-      </p:sp>
-    </p:spTree>
-    <p:extLst>
-      <p:ext uri="{BB962C8B-B14F-4D97-AF65-F5344CB8AC3E}">
-        <p14:creationId xmlns:p14="http://schemas.microsoft.com/office/powerpoint/2010/main" val="3222784279"/>
-      </p:ext>
-    </p:extLst>
-  </p:cSld>
-  <p:clrMapOvr>
-    <a:masterClrMapping/>
-  </p:clrMapOvr>
-  <p:timing>
-    <p:tnLst>
-      <p:par>
-        <p:cTn id="1" dur="indefinite" restart="never" nodeType="tmRoot"/>
-      </p:par>
-    </p:tnLst>
-  </p:timing>
-</p:sld>
-</file>
-
-<file path=ppt/slides/slide49.xml><?xml version="1.0" encoding="utf-8"?>
 <p:sld xmlns:a="http://schemas.openxmlformats.org/drawingml/2006/main" xmlns:r="http://schemas.openxmlformats.org/officeDocument/2006/relationships" xmlns:p="http://schemas.openxmlformats.org/presentationml/2006/main">
   <p:cSld>
     <p:spTree>
@@ -23172,6 +23175,561 @@
 </p:sld>
 </file>
 
+<file path=ppt/slides/slide49.xml><?xml version="1.0" encoding="utf-8"?>
+<p:sld xmlns:a="http://schemas.openxmlformats.org/drawingml/2006/main" xmlns:r="http://schemas.openxmlformats.org/officeDocument/2006/relationships" xmlns:p="http://schemas.openxmlformats.org/presentationml/2006/main">
+  <p:cSld>
+    <p:spTree>
+      <p:nvGrpSpPr>
+        <p:cNvPr id="1" name=""/>
+        <p:cNvGrpSpPr/>
+        <p:nvPr/>
+      </p:nvGrpSpPr>
+      <p:grpSpPr>
+        <a:xfrm>
+          <a:off x="0" y="0"/>
+          <a:ext cx="0" cy="0"/>
+          <a:chOff x="0" y="0"/>
+          <a:chExt cx="0" cy="0"/>
+        </a:xfrm>
+      </p:grpSpPr>
+      <p:sp>
+        <p:nvSpPr>
+          <p:cNvPr id="7" name="1 Título"/>
+          <p:cNvSpPr>
+            <a:spLocks noGrp="1"/>
+          </p:cNvSpPr>
+          <p:nvPr>
+            <p:ph type="title"/>
+          </p:nvPr>
+        </p:nvSpPr>
+        <p:spPr>
+          <a:xfrm>
+            <a:off x="529208" y="51761"/>
+            <a:ext cx="8229600" cy="1143000"/>
+          </a:xfrm>
+        </p:spPr>
+        <p:txBody>
+          <a:bodyPr/>
+          <a:lstStyle/>
+          <a:p>
+            <a:r>
+              <a:rPr lang="es-PE" dirty="0" smtClean="0">
+                <a:solidFill>
+                  <a:srgbClr val="009A46"/>
+                </a:solidFill>
+              </a:rPr>
+              <a:t>¿Cómo </a:t>
+            </a:r>
+            <a:r>
+              <a:rPr lang="es-PE" dirty="0" err="1" smtClean="0">
+                <a:solidFill>
+                  <a:srgbClr val="009A46"/>
+                </a:solidFill>
+              </a:rPr>
+              <a:t>refactorizar</a:t>
+            </a:r>
+            <a:r>
+              <a:rPr lang="es-PE" dirty="0" smtClean="0">
+                <a:solidFill>
+                  <a:srgbClr val="009A46"/>
+                </a:solidFill>
+              </a:rPr>
+              <a:t>?</a:t>
+            </a:r>
+            <a:endParaRPr lang="es-PE" dirty="0">
+              <a:solidFill>
+                <a:srgbClr val="009A46"/>
+              </a:solidFill>
+            </a:endParaRPr>
+          </a:p>
+        </p:txBody>
+      </p:sp>
+      <p:sp>
+        <p:nvSpPr>
+          <p:cNvPr id="9" name="5 Marcador de contenido"/>
+          <p:cNvSpPr txBox="1">
+            <a:spLocks/>
+          </p:cNvSpPr>
+          <p:nvPr/>
+        </p:nvSpPr>
+        <p:spPr bwMode="auto">
+          <a:xfrm>
+            <a:off x="1583668" y="1412776"/>
+            <a:ext cx="5976664" cy="504056"/>
+          </a:xfrm>
+          <a:prstGeom prst="rect">
+            <a:avLst/>
+          </a:prstGeom>
+          <a:noFill/>
+          <a:ln w="9525">
+            <a:noFill/>
+            <a:miter lim="800000"/>
+            <a:headEnd/>
+            <a:tailEnd/>
+          </a:ln>
+        </p:spPr>
+        <p:txBody>
+          <a:bodyPr vert="horz" wrap="square" lIns="91440" tIns="45720" rIns="91440" bIns="45720" numCol="1" anchor="t" anchorCtr="0" compatLnSpc="1">
+            <a:prstTxWarp prst="textNoShape">
+              <a:avLst/>
+            </a:prstTxWarp>
+          </a:bodyPr>
+          <a:lstStyle>
+            <a:lvl1pPr marL="342900" indent="-342900" algn="l" rtl="0" eaLnBrk="1" fontAlgn="base" hangingPunct="1">
+              <a:spcBef>
+                <a:spcPct val="20000"/>
+              </a:spcBef>
+              <a:spcAft>
+                <a:spcPct val="0"/>
+              </a:spcAft>
+              <a:buFont typeface="Arial" charset="0"/>
+              <a:buChar char="•"/>
+              <a:defRPr sz="3200" kern="1200">
+                <a:solidFill>
+                  <a:schemeClr val="tx1"/>
+                </a:solidFill>
+                <a:latin typeface="+mn-lt"/>
+                <a:ea typeface="+mn-ea"/>
+                <a:cs typeface="+mn-cs"/>
+              </a:defRPr>
+            </a:lvl1pPr>
+            <a:lvl2pPr marL="742950" indent="-285750" algn="l" rtl="0" eaLnBrk="1" fontAlgn="base" hangingPunct="1">
+              <a:spcBef>
+                <a:spcPct val="20000"/>
+              </a:spcBef>
+              <a:spcAft>
+                <a:spcPct val="0"/>
+              </a:spcAft>
+              <a:buFont typeface="Arial" charset="0"/>
+              <a:buChar char="–"/>
+              <a:defRPr sz="2800" kern="1200">
+                <a:solidFill>
+                  <a:schemeClr val="tx1"/>
+                </a:solidFill>
+                <a:latin typeface="+mn-lt"/>
+                <a:ea typeface="+mn-ea"/>
+                <a:cs typeface="+mn-cs"/>
+              </a:defRPr>
+            </a:lvl2pPr>
+            <a:lvl3pPr marL="1143000" indent="-228600" algn="l" rtl="0" eaLnBrk="1" fontAlgn="base" hangingPunct="1">
+              <a:spcBef>
+                <a:spcPct val="20000"/>
+              </a:spcBef>
+              <a:spcAft>
+                <a:spcPct val="0"/>
+              </a:spcAft>
+              <a:buFont typeface="Arial" charset="0"/>
+              <a:buChar char="•"/>
+              <a:defRPr sz="2400" kern="1200">
+                <a:solidFill>
+                  <a:schemeClr val="tx1"/>
+                </a:solidFill>
+                <a:latin typeface="+mn-lt"/>
+                <a:ea typeface="+mn-ea"/>
+                <a:cs typeface="+mn-cs"/>
+              </a:defRPr>
+            </a:lvl3pPr>
+            <a:lvl4pPr marL="1600200" indent="-228600" algn="l" rtl="0" eaLnBrk="1" fontAlgn="base" hangingPunct="1">
+              <a:spcBef>
+                <a:spcPct val="20000"/>
+              </a:spcBef>
+              <a:spcAft>
+                <a:spcPct val="0"/>
+              </a:spcAft>
+              <a:buFont typeface="Arial" charset="0"/>
+              <a:buChar char="–"/>
+              <a:defRPr sz="2000" kern="1200">
+                <a:solidFill>
+                  <a:schemeClr val="tx1"/>
+                </a:solidFill>
+                <a:latin typeface="+mn-lt"/>
+                <a:ea typeface="+mn-ea"/>
+                <a:cs typeface="+mn-cs"/>
+              </a:defRPr>
+            </a:lvl4pPr>
+            <a:lvl5pPr marL="2057400" indent="-228600" algn="l" rtl="0" eaLnBrk="1" fontAlgn="base" hangingPunct="1">
+              <a:spcBef>
+                <a:spcPct val="20000"/>
+              </a:spcBef>
+              <a:spcAft>
+                <a:spcPct val="0"/>
+              </a:spcAft>
+              <a:buFont typeface="Arial" charset="0"/>
+              <a:buChar char="»"/>
+              <a:defRPr sz="2000" kern="1200">
+                <a:solidFill>
+                  <a:schemeClr val="tx1"/>
+                </a:solidFill>
+                <a:latin typeface="+mn-lt"/>
+                <a:ea typeface="+mn-ea"/>
+                <a:cs typeface="+mn-cs"/>
+              </a:defRPr>
+            </a:lvl5pPr>
+            <a:lvl6pPr marL="2514600" indent="-228600" algn="l" defTabSz="914400" rtl="0" eaLnBrk="1" latinLnBrk="0" hangingPunct="1">
+              <a:spcBef>
+                <a:spcPct val="20000"/>
+              </a:spcBef>
+              <a:buFont typeface="Arial" pitchFamily="34" charset="0"/>
+              <a:buChar char="•"/>
+              <a:defRPr sz="2000" kern="1200">
+                <a:solidFill>
+                  <a:schemeClr val="tx1"/>
+                </a:solidFill>
+                <a:latin typeface="+mn-lt"/>
+                <a:ea typeface="+mn-ea"/>
+                <a:cs typeface="+mn-cs"/>
+              </a:defRPr>
+            </a:lvl6pPr>
+            <a:lvl7pPr marL="2971800" indent="-228600" algn="l" defTabSz="914400" rtl="0" eaLnBrk="1" latinLnBrk="0" hangingPunct="1">
+              <a:spcBef>
+                <a:spcPct val="20000"/>
+              </a:spcBef>
+              <a:buFont typeface="Arial" pitchFamily="34" charset="0"/>
+              <a:buChar char="•"/>
+              <a:defRPr sz="2000" kern="1200">
+                <a:solidFill>
+                  <a:schemeClr val="tx1"/>
+                </a:solidFill>
+                <a:latin typeface="+mn-lt"/>
+                <a:ea typeface="+mn-ea"/>
+                <a:cs typeface="+mn-cs"/>
+              </a:defRPr>
+            </a:lvl7pPr>
+            <a:lvl8pPr marL="3429000" indent="-228600" algn="l" defTabSz="914400" rtl="0" eaLnBrk="1" latinLnBrk="0" hangingPunct="1">
+              <a:spcBef>
+                <a:spcPct val="20000"/>
+              </a:spcBef>
+              <a:buFont typeface="Arial" pitchFamily="34" charset="0"/>
+              <a:buChar char="•"/>
+              <a:defRPr sz="2000" kern="1200">
+                <a:solidFill>
+                  <a:schemeClr val="tx1"/>
+                </a:solidFill>
+                <a:latin typeface="+mn-lt"/>
+                <a:ea typeface="+mn-ea"/>
+                <a:cs typeface="+mn-cs"/>
+              </a:defRPr>
+            </a:lvl8pPr>
+            <a:lvl9pPr marL="3886200" indent="-228600" algn="l" defTabSz="914400" rtl="0" eaLnBrk="1" latinLnBrk="0" hangingPunct="1">
+              <a:spcBef>
+                <a:spcPct val="20000"/>
+              </a:spcBef>
+              <a:buFont typeface="Arial" pitchFamily="34" charset="0"/>
+              <a:buChar char="•"/>
+              <a:defRPr sz="2000" kern="1200">
+                <a:solidFill>
+                  <a:schemeClr val="tx1"/>
+                </a:solidFill>
+                <a:latin typeface="+mn-lt"/>
+                <a:ea typeface="+mn-ea"/>
+                <a:cs typeface="+mn-cs"/>
+              </a:defRPr>
+            </a:lvl9pPr>
+          </a:lstStyle>
+          <a:p>
+            <a:pPr marL="0" indent="0" algn="ctr">
+              <a:buNone/>
+            </a:pPr>
+            <a:r>
+              <a:rPr lang="es-PE" b="1" dirty="0" smtClean="0">
+                <a:solidFill>
+                  <a:srgbClr val="FF0000"/>
+                </a:solidFill>
+              </a:rPr>
+              <a:t>Ejecutar </a:t>
+            </a:r>
+            <a:r>
+              <a:rPr lang="es-PE" b="1" dirty="0" err="1" smtClean="0">
+                <a:solidFill>
+                  <a:srgbClr val="FF0000"/>
+                </a:solidFill>
+              </a:rPr>
+              <a:t>Tests</a:t>
+            </a:r>
+            <a:r>
+              <a:rPr lang="es-PE" b="1" dirty="0" smtClean="0">
+                <a:solidFill>
+                  <a:srgbClr val="FF0000"/>
+                </a:solidFill>
+              </a:rPr>
+              <a:t> Frecuentemente </a:t>
+            </a:r>
+            <a:endParaRPr lang="es-PE" b="1" dirty="0">
+              <a:solidFill>
+                <a:srgbClr val="FF0000"/>
+              </a:solidFill>
+            </a:endParaRPr>
+          </a:p>
+        </p:txBody>
+      </p:sp>
+      <p:sp>
+        <p:nvSpPr>
+          <p:cNvPr id="11" name="5 Marcador de contenido"/>
+          <p:cNvSpPr txBox="1">
+            <a:spLocks/>
+          </p:cNvSpPr>
+          <p:nvPr/>
+        </p:nvSpPr>
+        <p:spPr bwMode="auto">
+          <a:xfrm>
+            <a:off x="395536" y="2204864"/>
+            <a:ext cx="8352928" cy="1368152"/>
+          </a:xfrm>
+          <a:prstGeom prst="rect">
+            <a:avLst/>
+          </a:prstGeom>
+          <a:noFill/>
+          <a:ln w="9525">
+            <a:noFill/>
+            <a:miter lim="800000"/>
+            <a:headEnd/>
+            <a:tailEnd/>
+          </a:ln>
+        </p:spPr>
+        <p:txBody>
+          <a:bodyPr vert="horz" wrap="square" lIns="91440" tIns="45720" rIns="91440" bIns="45720" numCol="1" anchor="t" anchorCtr="0" compatLnSpc="1">
+            <a:prstTxWarp prst="textNoShape">
+              <a:avLst/>
+            </a:prstTxWarp>
+          </a:bodyPr>
+          <a:lstStyle>
+            <a:lvl1pPr marL="342900" indent="-342900" algn="l" rtl="0" eaLnBrk="1" fontAlgn="base" hangingPunct="1">
+              <a:spcBef>
+                <a:spcPct val="20000"/>
+              </a:spcBef>
+              <a:spcAft>
+                <a:spcPct val="0"/>
+              </a:spcAft>
+              <a:buFont typeface="Arial" charset="0"/>
+              <a:buChar char="•"/>
+              <a:defRPr sz="3200" kern="1200">
+                <a:solidFill>
+                  <a:schemeClr val="tx1"/>
+                </a:solidFill>
+                <a:latin typeface="+mn-lt"/>
+                <a:ea typeface="+mn-ea"/>
+                <a:cs typeface="+mn-cs"/>
+              </a:defRPr>
+            </a:lvl1pPr>
+            <a:lvl2pPr marL="742950" indent="-285750" algn="l" rtl="0" eaLnBrk="1" fontAlgn="base" hangingPunct="1">
+              <a:spcBef>
+                <a:spcPct val="20000"/>
+              </a:spcBef>
+              <a:spcAft>
+                <a:spcPct val="0"/>
+              </a:spcAft>
+              <a:buFont typeface="Arial" charset="0"/>
+              <a:buChar char="–"/>
+              <a:defRPr sz="2800" kern="1200">
+                <a:solidFill>
+                  <a:schemeClr val="tx1"/>
+                </a:solidFill>
+                <a:latin typeface="+mn-lt"/>
+                <a:ea typeface="+mn-ea"/>
+                <a:cs typeface="+mn-cs"/>
+              </a:defRPr>
+            </a:lvl2pPr>
+            <a:lvl3pPr marL="1143000" indent="-228600" algn="l" rtl="0" eaLnBrk="1" fontAlgn="base" hangingPunct="1">
+              <a:spcBef>
+                <a:spcPct val="20000"/>
+              </a:spcBef>
+              <a:spcAft>
+                <a:spcPct val="0"/>
+              </a:spcAft>
+              <a:buFont typeface="Arial" charset="0"/>
+              <a:buChar char="•"/>
+              <a:defRPr sz="2400" kern="1200">
+                <a:solidFill>
+                  <a:schemeClr val="tx1"/>
+                </a:solidFill>
+                <a:latin typeface="+mn-lt"/>
+                <a:ea typeface="+mn-ea"/>
+                <a:cs typeface="+mn-cs"/>
+              </a:defRPr>
+            </a:lvl3pPr>
+            <a:lvl4pPr marL="1600200" indent="-228600" algn="l" rtl="0" eaLnBrk="1" fontAlgn="base" hangingPunct="1">
+              <a:spcBef>
+                <a:spcPct val="20000"/>
+              </a:spcBef>
+              <a:spcAft>
+                <a:spcPct val="0"/>
+              </a:spcAft>
+              <a:buFont typeface="Arial" charset="0"/>
+              <a:buChar char="–"/>
+              <a:defRPr sz="2000" kern="1200">
+                <a:solidFill>
+                  <a:schemeClr val="tx1"/>
+                </a:solidFill>
+                <a:latin typeface="+mn-lt"/>
+                <a:ea typeface="+mn-ea"/>
+                <a:cs typeface="+mn-cs"/>
+              </a:defRPr>
+            </a:lvl4pPr>
+            <a:lvl5pPr marL="2057400" indent="-228600" algn="l" rtl="0" eaLnBrk="1" fontAlgn="base" hangingPunct="1">
+              <a:spcBef>
+                <a:spcPct val="20000"/>
+              </a:spcBef>
+              <a:spcAft>
+                <a:spcPct val="0"/>
+              </a:spcAft>
+              <a:buFont typeface="Arial" charset="0"/>
+              <a:buChar char="»"/>
+              <a:defRPr sz="2000" kern="1200">
+                <a:solidFill>
+                  <a:schemeClr val="tx1"/>
+                </a:solidFill>
+                <a:latin typeface="+mn-lt"/>
+                <a:ea typeface="+mn-ea"/>
+                <a:cs typeface="+mn-cs"/>
+              </a:defRPr>
+            </a:lvl5pPr>
+            <a:lvl6pPr marL="2514600" indent="-228600" algn="l" defTabSz="914400" rtl="0" eaLnBrk="1" latinLnBrk="0" hangingPunct="1">
+              <a:spcBef>
+                <a:spcPct val="20000"/>
+              </a:spcBef>
+              <a:buFont typeface="Arial" pitchFamily="34" charset="0"/>
+              <a:buChar char="•"/>
+              <a:defRPr sz="2000" kern="1200">
+                <a:solidFill>
+                  <a:schemeClr val="tx1"/>
+                </a:solidFill>
+                <a:latin typeface="+mn-lt"/>
+                <a:ea typeface="+mn-ea"/>
+                <a:cs typeface="+mn-cs"/>
+              </a:defRPr>
+            </a:lvl6pPr>
+            <a:lvl7pPr marL="2971800" indent="-228600" algn="l" defTabSz="914400" rtl="0" eaLnBrk="1" latinLnBrk="0" hangingPunct="1">
+              <a:spcBef>
+                <a:spcPct val="20000"/>
+              </a:spcBef>
+              <a:buFont typeface="Arial" pitchFamily="34" charset="0"/>
+              <a:buChar char="•"/>
+              <a:defRPr sz="2000" kern="1200">
+                <a:solidFill>
+                  <a:schemeClr val="tx1"/>
+                </a:solidFill>
+                <a:latin typeface="+mn-lt"/>
+                <a:ea typeface="+mn-ea"/>
+                <a:cs typeface="+mn-cs"/>
+              </a:defRPr>
+            </a:lvl7pPr>
+            <a:lvl8pPr marL="3429000" indent="-228600" algn="l" defTabSz="914400" rtl="0" eaLnBrk="1" latinLnBrk="0" hangingPunct="1">
+              <a:spcBef>
+                <a:spcPct val="20000"/>
+              </a:spcBef>
+              <a:buFont typeface="Arial" pitchFamily="34" charset="0"/>
+              <a:buChar char="•"/>
+              <a:defRPr sz="2000" kern="1200">
+                <a:solidFill>
+                  <a:schemeClr val="tx1"/>
+                </a:solidFill>
+                <a:latin typeface="+mn-lt"/>
+                <a:ea typeface="+mn-ea"/>
+                <a:cs typeface="+mn-cs"/>
+              </a:defRPr>
+            </a:lvl8pPr>
+            <a:lvl9pPr marL="3886200" indent="-228600" algn="l" defTabSz="914400" rtl="0" eaLnBrk="1" latinLnBrk="0" hangingPunct="1">
+              <a:spcBef>
+                <a:spcPct val="20000"/>
+              </a:spcBef>
+              <a:buFont typeface="Arial" pitchFamily="34" charset="0"/>
+              <a:buChar char="•"/>
+              <a:defRPr sz="2000" kern="1200">
+                <a:solidFill>
+                  <a:schemeClr val="tx1"/>
+                </a:solidFill>
+                <a:latin typeface="+mn-lt"/>
+                <a:ea typeface="+mn-ea"/>
+                <a:cs typeface="+mn-cs"/>
+              </a:defRPr>
+            </a:lvl9pPr>
+          </a:lstStyle>
+          <a:p>
+            <a:pPr marL="0" indent="0" algn="ctr">
+              <a:buNone/>
+            </a:pPr>
+            <a:r>
+              <a:rPr lang="es-PE" sz="2800" dirty="0" smtClean="0">
+                <a:solidFill>
+                  <a:schemeClr val="tx1">
+                    <a:lumMod val="95000"/>
+                  </a:schemeClr>
+                </a:solidFill>
+              </a:rPr>
+              <a:t>Cualquier cambio al código puede introducir defectos. Ejecutar los </a:t>
+            </a:r>
+            <a:r>
+              <a:rPr lang="es-PE" sz="2800" dirty="0" err="1" smtClean="0">
+                <a:solidFill>
+                  <a:schemeClr val="tx1">
+                    <a:lumMod val="95000"/>
+                  </a:schemeClr>
+                </a:solidFill>
+              </a:rPr>
+              <a:t>tests</a:t>
+            </a:r>
+            <a:r>
+              <a:rPr lang="es-PE" sz="2800" dirty="0" smtClean="0">
+                <a:solidFill>
+                  <a:schemeClr val="tx1">
+                    <a:lumMod val="95000"/>
+                  </a:schemeClr>
+                </a:solidFill>
+              </a:rPr>
+              <a:t> luego de cada cambio nos permitirá detectar errores de manera oportuna.</a:t>
+            </a:r>
+            <a:endParaRPr lang="es-PE" sz="2800" dirty="0">
+              <a:solidFill>
+                <a:schemeClr val="tx1">
+                  <a:lumMod val="95000"/>
+                </a:schemeClr>
+              </a:solidFill>
+            </a:endParaRPr>
+          </a:p>
+        </p:txBody>
+      </p:sp>
+      <p:graphicFrame>
+        <p:nvGraphicFramePr>
+          <p:cNvPr id="13" name="12 Diagrama"/>
+          <p:cNvGraphicFramePr/>
+          <p:nvPr>
+            <p:extLst>
+              <p:ext uri="{D42A27DB-BD31-4B8C-83A1-F6EECF244321}">
+                <p14:modId xmlns:p14="http://schemas.microsoft.com/office/powerpoint/2010/main" val="1038885685"/>
+              </p:ext>
+            </p:extLst>
+          </p:nvPr>
+        </p:nvGraphicFramePr>
+        <p:xfrm>
+          <a:off x="656531" y="4005064"/>
+          <a:ext cx="7992887" cy="758879"/>
+        </p:xfrm>
+        <a:graphic>
+          <a:graphicData uri="http://schemas.openxmlformats.org/drawingml/2006/diagram">
+            <dgm:relIds xmlns:dgm="http://schemas.openxmlformats.org/drawingml/2006/diagram" xmlns:r="http://schemas.openxmlformats.org/officeDocument/2006/relationships" r:dm="rId3" r:lo="rId4" r:qs="rId5" r:cs="rId6"/>
+          </a:graphicData>
+        </a:graphic>
+      </p:graphicFrame>
+    </p:spTree>
+    <p:extLst>
+      <p:ext uri="{BB962C8B-B14F-4D97-AF65-F5344CB8AC3E}">
+        <p14:creationId xmlns:p14="http://schemas.microsoft.com/office/powerpoint/2010/main" val="399224212"/>
+      </p:ext>
+    </p:extLst>
+  </p:cSld>
+  <p:clrMapOvr>
+    <a:masterClrMapping/>
+  </p:clrMapOvr>
+  <p:timing>
+    <p:tnLst>
+      <p:par>
+        <p:cTn id="1" dur="indefinite" restart="never" nodeType="tmRoot"/>
+      </p:par>
+    </p:tnLst>
+  </p:timing>
+</p:sld>
+</file>
+
 <file path=ppt/slides/slide5.xml><?xml version="1.0" encoding="utf-8"?>
 <p:sld xmlns:a="http://schemas.openxmlformats.org/drawingml/2006/main" xmlns:r="http://schemas.openxmlformats.org/officeDocument/2006/relationships" xmlns:p="http://schemas.openxmlformats.org/presentationml/2006/main">
   <p:cSld>
@@ -23487,561 +24045,6 @@
         </p:nvSpPr>
         <p:spPr>
           <a:xfrm>
-            <a:off x="529208" y="51761"/>
-            <a:ext cx="8229600" cy="1143000"/>
-          </a:xfrm>
-        </p:spPr>
-        <p:txBody>
-          <a:bodyPr/>
-          <a:lstStyle/>
-          <a:p>
-            <a:r>
-              <a:rPr lang="es-PE" dirty="0" smtClean="0">
-                <a:solidFill>
-                  <a:srgbClr val="009A46"/>
-                </a:solidFill>
-              </a:rPr>
-              <a:t>¿Cómo </a:t>
-            </a:r>
-            <a:r>
-              <a:rPr lang="es-PE" dirty="0" err="1" smtClean="0">
-                <a:solidFill>
-                  <a:srgbClr val="009A46"/>
-                </a:solidFill>
-              </a:rPr>
-              <a:t>refactorizar</a:t>
-            </a:r>
-            <a:r>
-              <a:rPr lang="es-PE" dirty="0" smtClean="0">
-                <a:solidFill>
-                  <a:srgbClr val="009A46"/>
-                </a:solidFill>
-              </a:rPr>
-              <a:t>?</a:t>
-            </a:r>
-            <a:endParaRPr lang="es-PE" dirty="0">
-              <a:solidFill>
-                <a:srgbClr val="009A46"/>
-              </a:solidFill>
-            </a:endParaRPr>
-          </a:p>
-        </p:txBody>
-      </p:sp>
-      <p:sp>
-        <p:nvSpPr>
-          <p:cNvPr id="9" name="5 Marcador de contenido"/>
-          <p:cNvSpPr txBox="1">
-            <a:spLocks/>
-          </p:cNvSpPr>
-          <p:nvPr/>
-        </p:nvSpPr>
-        <p:spPr bwMode="auto">
-          <a:xfrm>
-            <a:off x="1583668" y="1412776"/>
-            <a:ext cx="5976664" cy="504056"/>
-          </a:xfrm>
-          <a:prstGeom prst="rect">
-            <a:avLst/>
-          </a:prstGeom>
-          <a:noFill/>
-          <a:ln w="9525">
-            <a:noFill/>
-            <a:miter lim="800000"/>
-            <a:headEnd/>
-            <a:tailEnd/>
-          </a:ln>
-        </p:spPr>
-        <p:txBody>
-          <a:bodyPr vert="horz" wrap="square" lIns="91440" tIns="45720" rIns="91440" bIns="45720" numCol="1" anchor="t" anchorCtr="0" compatLnSpc="1">
-            <a:prstTxWarp prst="textNoShape">
-              <a:avLst/>
-            </a:prstTxWarp>
-          </a:bodyPr>
-          <a:lstStyle>
-            <a:lvl1pPr marL="342900" indent="-342900" algn="l" rtl="0" eaLnBrk="1" fontAlgn="base" hangingPunct="1">
-              <a:spcBef>
-                <a:spcPct val="20000"/>
-              </a:spcBef>
-              <a:spcAft>
-                <a:spcPct val="0"/>
-              </a:spcAft>
-              <a:buFont typeface="Arial" charset="0"/>
-              <a:buChar char="•"/>
-              <a:defRPr sz="3200" kern="1200">
-                <a:solidFill>
-                  <a:schemeClr val="tx1"/>
-                </a:solidFill>
-                <a:latin typeface="+mn-lt"/>
-                <a:ea typeface="+mn-ea"/>
-                <a:cs typeface="+mn-cs"/>
-              </a:defRPr>
-            </a:lvl1pPr>
-            <a:lvl2pPr marL="742950" indent="-285750" algn="l" rtl="0" eaLnBrk="1" fontAlgn="base" hangingPunct="1">
-              <a:spcBef>
-                <a:spcPct val="20000"/>
-              </a:spcBef>
-              <a:spcAft>
-                <a:spcPct val="0"/>
-              </a:spcAft>
-              <a:buFont typeface="Arial" charset="0"/>
-              <a:buChar char="–"/>
-              <a:defRPr sz="2800" kern="1200">
-                <a:solidFill>
-                  <a:schemeClr val="tx1"/>
-                </a:solidFill>
-                <a:latin typeface="+mn-lt"/>
-                <a:ea typeface="+mn-ea"/>
-                <a:cs typeface="+mn-cs"/>
-              </a:defRPr>
-            </a:lvl2pPr>
-            <a:lvl3pPr marL="1143000" indent="-228600" algn="l" rtl="0" eaLnBrk="1" fontAlgn="base" hangingPunct="1">
-              <a:spcBef>
-                <a:spcPct val="20000"/>
-              </a:spcBef>
-              <a:spcAft>
-                <a:spcPct val="0"/>
-              </a:spcAft>
-              <a:buFont typeface="Arial" charset="0"/>
-              <a:buChar char="•"/>
-              <a:defRPr sz="2400" kern="1200">
-                <a:solidFill>
-                  <a:schemeClr val="tx1"/>
-                </a:solidFill>
-                <a:latin typeface="+mn-lt"/>
-                <a:ea typeface="+mn-ea"/>
-                <a:cs typeface="+mn-cs"/>
-              </a:defRPr>
-            </a:lvl3pPr>
-            <a:lvl4pPr marL="1600200" indent="-228600" algn="l" rtl="0" eaLnBrk="1" fontAlgn="base" hangingPunct="1">
-              <a:spcBef>
-                <a:spcPct val="20000"/>
-              </a:spcBef>
-              <a:spcAft>
-                <a:spcPct val="0"/>
-              </a:spcAft>
-              <a:buFont typeface="Arial" charset="0"/>
-              <a:buChar char="–"/>
-              <a:defRPr sz="2000" kern="1200">
-                <a:solidFill>
-                  <a:schemeClr val="tx1"/>
-                </a:solidFill>
-                <a:latin typeface="+mn-lt"/>
-                <a:ea typeface="+mn-ea"/>
-                <a:cs typeface="+mn-cs"/>
-              </a:defRPr>
-            </a:lvl4pPr>
-            <a:lvl5pPr marL="2057400" indent="-228600" algn="l" rtl="0" eaLnBrk="1" fontAlgn="base" hangingPunct="1">
-              <a:spcBef>
-                <a:spcPct val="20000"/>
-              </a:spcBef>
-              <a:spcAft>
-                <a:spcPct val="0"/>
-              </a:spcAft>
-              <a:buFont typeface="Arial" charset="0"/>
-              <a:buChar char="»"/>
-              <a:defRPr sz="2000" kern="1200">
-                <a:solidFill>
-                  <a:schemeClr val="tx1"/>
-                </a:solidFill>
-                <a:latin typeface="+mn-lt"/>
-                <a:ea typeface="+mn-ea"/>
-                <a:cs typeface="+mn-cs"/>
-              </a:defRPr>
-            </a:lvl5pPr>
-            <a:lvl6pPr marL="2514600" indent="-228600" algn="l" defTabSz="914400" rtl="0" eaLnBrk="1" latinLnBrk="0" hangingPunct="1">
-              <a:spcBef>
-                <a:spcPct val="20000"/>
-              </a:spcBef>
-              <a:buFont typeface="Arial" pitchFamily="34" charset="0"/>
-              <a:buChar char="•"/>
-              <a:defRPr sz="2000" kern="1200">
-                <a:solidFill>
-                  <a:schemeClr val="tx1"/>
-                </a:solidFill>
-                <a:latin typeface="+mn-lt"/>
-                <a:ea typeface="+mn-ea"/>
-                <a:cs typeface="+mn-cs"/>
-              </a:defRPr>
-            </a:lvl6pPr>
-            <a:lvl7pPr marL="2971800" indent="-228600" algn="l" defTabSz="914400" rtl="0" eaLnBrk="1" latinLnBrk="0" hangingPunct="1">
-              <a:spcBef>
-                <a:spcPct val="20000"/>
-              </a:spcBef>
-              <a:buFont typeface="Arial" pitchFamily="34" charset="0"/>
-              <a:buChar char="•"/>
-              <a:defRPr sz="2000" kern="1200">
-                <a:solidFill>
-                  <a:schemeClr val="tx1"/>
-                </a:solidFill>
-                <a:latin typeface="+mn-lt"/>
-                <a:ea typeface="+mn-ea"/>
-                <a:cs typeface="+mn-cs"/>
-              </a:defRPr>
-            </a:lvl7pPr>
-            <a:lvl8pPr marL="3429000" indent="-228600" algn="l" defTabSz="914400" rtl="0" eaLnBrk="1" latinLnBrk="0" hangingPunct="1">
-              <a:spcBef>
-                <a:spcPct val="20000"/>
-              </a:spcBef>
-              <a:buFont typeface="Arial" pitchFamily="34" charset="0"/>
-              <a:buChar char="•"/>
-              <a:defRPr sz="2000" kern="1200">
-                <a:solidFill>
-                  <a:schemeClr val="tx1"/>
-                </a:solidFill>
-                <a:latin typeface="+mn-lt"/>
-                <a:ea typeface="+mn-ea"/>
-                <a:cs typeface="+mn-cs"/>
-              </a:defRPr>
-            </a:lvl8pPr>
-            <a:lvl9pPr marL="3886200" indent="-228600" algn="l" defTabSz="914400" rtl="0" eaLnBrk="1" latinLnBrk="0" hangingPunct="1">
-              <a:spcBef>
-                <a:spcPct val="20000"/>
-              </a:spcBef>
-              <a:buFont typeface="Arial" pitchFamily="34" charset="0"/>
-              <a:buChar char="•"/>
-              <a:defRPr sz="2000" kern="1200">
-                <a:solidFill>
-                  <a:schemeClr val="tx1"/>
-                </a:solidFill>
-                <a:latin typeface="+mn-lt"/>
-                <a:ea typeface="+mn-ea"/>
-                <a:cs typeface="+mn-cs"/>
-              </a:defRPr>
-            </a:lvl9pPr>
-          </a:lstStyle>
-          <a:p>
-            <a:pPr marL="0" indent="0" algn="ctr">
-              <a:buNone/>
-            </a:pPr>
-            <a:r>
-              <a:rPr lang="es-PE" b="1" dirty="0" smtClean="0">
-                <a:solidFill>
-                  <a:srgbClr val="FF0000"/>
-                </a:solidFill>
-              </a:rPr>
-              <a:t>Ejecutar </a:t>
-            </a:r>
-            <a:r>
-              <a:rPr lang="es-PE" b="1" dirty="0" err="1" smtClean="0">
-                <a:solidFill>
-                  <a:srgbClr val="FF0000"/>
-                </a:solidFill>
-              </a:rPr>
-              <a:t>Tests</a:t>
-            </a:r>
-            <a:r>
-              <a:rPr lang="es-PE" b="1" dirty="0" smtClean="0">
-                <a:solidFill>
-                  <a:srgbClr val="FF0000"/>
-                </a:solidFill>
-              </a:rPr>
-              <a:t> Frecuentemente </a:t>
-            </a:r>
-            <a:endParaRPr lang="es-PE" b="1" dirty="0">
-              <a:solidFill>
-                <a:srgbClr val="FF0000"/>
-              </a:solidFill>
-            </a:endParaRPr>
-          </a:p>
-        </p:txBody>
-      </p:sp>
-      <p:sp>
-        <p:nvSpPr>
-          <p:cNvPr id="11" name="5 Marcador de contenido"/>
-          <p:cNvSpPr txBox="1">
-            <a:spLocks/>
-          </p:cNvSpPr>
-          <p:nvPr/>
-        </p:nvSpPr>
-        <p:spPr bwMode="auto">
-          <a:xfrm>
-            <a:off x="395536" y="2204864"/>
-            <a:ext cx="8352928" cy="1368152"/>
-          </a:xfrm>
-          <a:prstGeom prst="rect">
-            <a:avLst/>
-          </a:prstGeom>
-          <a:noFill/>
-          <a:ln w="9525">
-            <a:noFill/>
-            <a:miter lim="800000"/>
-            <a:headEnd/>
-            <a:tailEnd/>
-          </a:ln>
-        </p:spPr>
-        <p:txBody>
-          <a:bodyPr vert="horz" wrap="square" lIns="91440" tIns="45720" rIns="91440" bIns="45720" numCol="1" anchor="t" anchorCtr="0" compatLnSpc="1">
-            <a:prstTxWarp prst="textNoShape">
-              <a:avLst/>
-            </a:prstTxWarp>
-          </a:bodyPr>
-          <a:lstStyle>
-            <a:lvl1pPr marL="342900" indent="-342900" algn="l" rtl="0" eaLnBrk="1" fontAlgn="base" hangingPunct="1">
-              <a:spcBef>
-                <a:spcPct val="20000"/>
-              </a:spcBef>
-              <a:spcAft>
-                <a:spcPct val="0"/>
-              </a:spcAft>
-              <a:buFont typeface="Arial" charset="0"/>
-              <a:buChar char="•"/>
-              <a:defRPr sz="3200" kern="1200">
-                <a:solidFill>
-                  <a:schemeClr val="tx1"/>
-                </a:solidFill>
-                <a:latin typeface="+mn-lt"/>
-                <a:ea typeface="+mn-ea"/>
-                <a:cs typeface="+mn-cs"/>
-              </a:defRPr>
-            </a:lvl1pPr>
-            <a:lvl2pPr marL="742950" indent="-285750" algn="l" rtl="0" eaLnBrk="1" fontAlgn="base" hangingPunct="1">
-              <a:spcBef>
-                <a:spcPct val="20000"/>
-              </a:spcBef>
-              <a:spcAft>
-                <a:spcPct val="0"/>
-              </a:spcAft>
-              <a:buFont typeface="Arial" charset="0"/>
-              <a:buChar char="–"/>
-              <a:defRPr sz="2800" kern="1200">
-                <a:solidFill>
-                  <a:schemeClr val="tx1"/>
-                </a:solidFill>
-                <a:latin typeface="+mn-lt"/>
-                <a:ea typeface="+mn-ea"/>
-                <a:cs typeface="+mn-cs"/>
-              </a:defRPr>
-            </a:lvl2pPr>
-            <a:lvl3pPr marL="1143000" indent="-228600" algn="l" rtl="0" eaLnBrk="1" fontAlgn="base" hangingPunct="1">
-              <a:spcBef>
-                <a:spcPct val="20000"/>
-              </a:spcBef>
-              <a:spcAft>
-                <a:spcPct val="0"/>
-              </a:spcAft>
-              <a:buFont typeface="Arial" charset="0"/>
-              <a:buChar char="•"/>
-              <a:defRPr sz="2400" kern="1200">
-                <a:solidFill>
-                  <a:schemeClr val="tx1"/>
-                </a:solidFill>
-                <a:latin typeface="+mn-lt"/>
-                <a:ea typeface="+mn-ea"/>
-                <a:cs typeface="+mn-cs"/>
-              </a:defRPr>
-            </a:lvl3pPr>
-            <a:lvl4pPr marL="1600200" indent="-228600" algn="l" rtl="0" eaLnBrk="1" fontAlgn="base" hangingPunct="1">
-              <a:spcBef>
-                <a:spcPct val="20000"/>
-              </a:spcBef>
-              <a:spcAft>
-                <a:spcPct val="0"/>
-              </a:spcAft>
-              <a:buFont typeface="Arial" charset="0"/>
-              <a:buChar char="–"/>
-              <a:defRPr sz="2000" kern="1200">
-                <a:solidFill>
-                  <a:schemeClr val="tx1"/>
-                </a:solidFill>
-                <a:latin typeface="+mn-lt"/>
-                <a:ea typeface="+mn-ea"/>
-                <a:cs typeface="+mn-cs"/>
-              </a:defRPr>
-            </a:lvl4pPr>
-            <a:lvl5pPr marL="2057400" indent="-228600" algn="l" rtl="0" eaLnBrk="1" fontAlgn="base" hangingPunct="1">
-              <a:spcBef>
-                <a:spcPct val="20000"/>
-              </a:spcBef>
-              <a:spcAft>
-                <a:spcPct val="0"/>
-              </a:spcAft>
-              <a:buFont typeface="Arial" charset="0"/>
-              <a:buChar char="»"/>
-              <a:defRPr sz="2000" kern="1200">
-                <a:solidFill>
-                  <a:schemeClr val="tx1"/>
-                </a:solidFill>
-                <a:latin typeface="+mn-lt"/>
-                <a:ea typeface="+mn-ea"/>
-                <a:cs typeface="+mn-cs"/>
-              </a:defRPr>
-            </a:lvl5pPr>
-            <a:lvl6pPr marL="2514600" indent="-228600" algn="l" defTabSz="914400" rtl="0" eaLnBrk="1" latinLnBrk="0" hangingPunct="1">
-              <a:spcBef>
-                <a:spcPct val="20000"/>
-              </a:spcBef>
-              <a:buFont typeface="Arial" pitchFamily="34" charset="0"/>
-              <a:buChar char="•"/>
-              <a:defRPr sz="2000" kern="1200">
-                <a:solidFill>
-                  <a:schemeClr val="tx1"/>
-                </a:solidFill>
-                <a:latin typeface="+mn-lt"/>
-                <a:ea typeface="+mn-ea"/>
-                <a:cs typeface="+mn-cs"/>
-              </a:defRPr>
-            </a:lvl6pPr>
-            <a:lvl7pPr marL="2971800" indent="-228600" algn="l" defTabSz="914400" rtl="0" eaLnBrk="1" latinLnBrk="0" hangingPunct="1">
-              <a:spcBef>
-                <a:spcPct val="20000"/>
-              </a:spcBef>
-              <a:buFont typeface="Arial" pitchFamily="34" charset="0"/>
-              <a:buChar char="•"/>
-              <a:defRPr sz="2000" kern="1200">
-                <a:solidFill>
-                  <a:schemeClr val="tx1"/>
-                </a:solidFill>
-                <a:latin typeface="+mn-lt"/>
-                <a:ea typeface="+mn-ea"/>
-                <a:cs typeface="+mn-cs"/>
-              </a:defRPr>
-            </a:lvl7pPr>
-            <a:lvl8pPr marL="3429000" indent="-228600" algn="l" defTabSz="914400" rtl="0" eaLnBrk="1" latinLnBrk="0" hangingPunct="1">
-              <a:spcBef>
-                <a:spcPct val="20000"/>
-              </a:spcBef>
-              <a:buFont typeface="Arial" pitchFamily="34" charset="0"/>
-              <a:buChar char="•"/>
-              <a:defRPr sz="2000" kern="1200">
-                <a:solidFill>
-                  <a:schemeClr val="tx1"/>
-                </a:solidFill>
-                <a:latin typeface="+mn-lt"/>
-                <a:ea typeface="+mn-ea"/>
-                <a:cs typeface="+mn-cs"/>
-              </a:defRPr>
-            </a:lvl8pPr>
-            <a:lvl9pPr marL="3886200" indent="-228600" algn="l" defTabSz="914400" rtl="0" eaLnBrk="1" latinLnBrk="0" hangingPunct="1">
-              <a:spcBef>
-                <a:spcPct val="20000"/>
-              </a:spcBef>
-              <a:buFont typeface="Arial" pitchFamily="34" charset="0"/>
-              <a:buChar char="•"/>
-              <a:defRPr sz="2000" kern="1200">
-                <a:solidFill>
-                  <a:schemeClr val="tx1"/>
-                </a:solidFill>
-                <a:latin typeface="+mn-lt"/>
-                <a:ea typeface="+mn-ea"/>
-                <a:cs typeface="+mn-cs"/>
-              </a:defRPr>
-            </a:lvl9pPr>
-          </a:lstStyle>
-          <a:p>
-            <a:pPr marL="0" indent="0" algn="ctr">
-              <a:buNone/>
-            </a:pPr>
-            <a:r>
-              <a:rPr lang="es-PE" sz="2800" dirty="0" smtClean="0">
-                <a:solidFill>
-                  <a:schemeClr val="tx1">
-                    <a:lumMod val="95000"/>
-                  </a:schemeClr>
-                </a:solidFill>
-              </a:rPr>
-              <a:t>Cualquier cambio al código puede introducir defectos. Ejecutar los </a:t>
-            </a:r>
-            <a:r>
-              <a:rPr lang="es-PE" sz="2800" dirty="0" err="1" smtClean="0">
-                <a:solidFill>
-                  <a:schemeClr val="tx1">
-                    <a:lumMod val="95000"/>
-                  </a:schemeClr>
-                </a:solidFill>
-              </a:rPr>
-              <a:t>tests</a:t>
-            </a:r>
-            <a:r>
-              <a:rPr lang="es-PE" sz="2800" dirty="0" smtClean="0">
-                <a:solidFill>
-                  <a:schemeClr val="tx1">
-                    <a:lumMod val="95000"/>
-                  </a:schemeClr>
-                </a:solidFill>
-              </a:rPr>
-              <a:t> luego de cada cambio nos permitirá detectar errores de manera oportuna.</a:t>
-            </a:r>
-            <a:endParaRPr lang="es-PE" sz="2800" dirty="0">
-              <a:solidFill>
-                <a:schemeClr val="tx1">
-                  <a:lumMod val="95000"/>
-                </a:schemeClr>
-              </a:solidFill>
-            </a:endParaRPr>
-          </a:p>
-        </p:txBody>
-      </p:sp>
-      <p:graphicFrame>
-        <p:nvGraphicFramePr>
-          <p:cNvPr id="13" name="12 Diagrama"/>
-          <p:cNvGraphicFramePr/>
-          <p:nvPr>
-            <p:extLst>
-              <p:ext uri="{D42A27DB-BD31-4B8C-83A1-F6EECF244321}">
-                <p14:modId xmlns:p14="http://schemas.microsoft.com/office/powerpoint/2010/main" val="1038885685"/>
-              </p:ext>
-            </p:extLst>
-          </p:nvPr>
-        </p:nvGraphicFramePr>
-        <p:xfrm>
-          <a:off x="656531" y="4005064"/>
-          <a:ext cx="7992887" cy="758879"/>
-        </p:xfrm>
-        <a:graphic>
-          <a:graphicData uri="http://schemas.openxmlformats.org/drawingml/2006/diagram">
-            <dgm:relIds xmlns:dgm="http://schemas.openxmlformats.org/drawingml/2006/diagram" xmlns:r="http://schemas.openxmlformats.org/officeDocument/2006/relationships" r:dm="rId3" r:lo="rId4" r:qs="rId5" r:cs="rId6"/>
-          </a:graphicData>
-        </a:graphic>
-      </p:graphicFrame>
-    </p:spTree>
-    <p:extLst>
-      <p:ext uri="{BB962C8B-B14F-4D97-AF65-F5344CB8AC3E}">
-        <p14:creationId xmlns:p14="http://schemas.microsoft.com/office/powerpoint/2010/main" val="399224212"/>
-      </p:ext>
-    </p:extLst>
-  </p:cSld>
-  <p:clrMapOvr>
-    <a:masterClrMapping/>
-  </p:clrMapOvr>
-  <p:timing>
-    <p:tnLst>
-      <p:par>
-        <p:cTn id="1" dur="indefinite" restart="never" nodeType="tmRoot"/>
-      </p:par>
-    </p:tnLst>
-  </p:timing>
-</p:sld>
-</file>
-
-<file path=ppt/slides/slide51.xml><?xml version="1.0" encoding="utf-8"?>
-<p:sld xmlns:a="http://schemas.openxmlformats.org/drawingml/2006/main" xmlns:r="http://schemas.openxmlformats.org/officeDocument/2006/relationships" xmlns:p="http://schemas.openxmlformats.org/presentationml/2006/main">
-  <p:cSld>
-    <p:spTree>
-      <p:nvGrpSpPr>
-        <p:cNvPr id="1" name=""/>
-        <p:cNvGrpSpPr/>
-        <p:nvPr/>
-      </p:nvGrpSpPr>
-      <p:grpSpPr>
-        <a:xfrm>
-          <a:off x="0" y="0"/>
-          <a:ext cx="0" cy="0"/>
-          <a:chOff x="0" y="0"/>
-          <a:chExt cx="0" cy="0"/>
-        </a:xfrm>
-      </p:grpSpPr>
-      <p:sp>
-        <p:nvSpPr>
-          <p:cNvPr id="7" name="1 Título"/>
-          <p:cNvSpPr>
-            <a:spLocks noGrp="1"/>
-          </p:cNvSpPr>
-          <p:nvPr>
-            <p:ph type="title"/>
-          </p:nvPr>
-        </p:nvSpPr>
-        <p:spPr>
-          <a:xfrm>
             <a:off x="505024" y="548680"/>
             <a:ext cx="8229600" cy="1143000"/>
           </a:xfrm>
@@ -24332,6 +24335,163 @@
     <p:extLst>
       <p:ext uri="{BB962C8B-B14F-4D97-AF65-F5344CB8AC3E}">
         <p14:creationId xmlns:p14="http://schemas.microsoft.com/office/powerpoint/2010/main" val="3649338716"/>
+      </p:ext>
+    </p:extLst>
+  </p:cSld>
+  <p:clrMapOvr>
+    <a:masterClrMapping/>
+  </p:clrMapOvr>
+  <p:timing>
+    <p:tnLst>
+      <p:par>
+        <p:cTn id="1" dur="indefinite" restart="never" nodeType="tmRoot"/>
+      </p:par>
+    </p:tnLst>
+  </p:timing>
+</p:sld>
+</file>
+
+<file path=ppt/slides/slide51.xml><?xml version="1.0" encoding="utf-8"?>
+<p:sld xmlns:a="http://schemas.openxmlformats.org/drawingml/2006/main" xmlns:r="http://schemas.openxmlformats.org/officeDocument/2006/relationships" xmlns:p="http://schemas.openxmlformats.org/presentationml/2006/main">
+  <p:cSld>
+    <p:spTree>
+      <p:nvGrpSpPr>
+        <p:cNvPr id="1" name=""/>
+        <p:cNvGrpSpPr/>
+        <p:nvPr/>
+      </p:nvGrpSpPr>
+      <p:grpSpPr>
+        <a:xfrm>
+          <a:off x="0" y="0"/>
+          <a:ext cx="0" cy="0"/>
+          <a:chOff x="0" y="0"/>
+          <a:chExt cx="0" cy="0"/>
+        </a:xfrm>
+      </p:grpSpPr>
+      <p:sp>
+        <p:nvSpPr>
+          <p:cNvPr id="3" name="2 Título"/>
+          <p:cNvSpPr>
+            <a:spLocks noGrp="1"/>
+          </p:cNvSpPr>
+          <p:nvPr>
+            <p:ph type="title"/>
+          </p:nvPr>
+        </p:nvSpPr>
+        <p:spPr>
+          <a:xfrm>
+            <a:off x="446856" y="260648"/>
+            <a:ext cx="8229600" cy="2088232"/>
+          </a:xfrm>
+        </p:spPr>
+        <p:txBody>
+          <a:bodyPr/>
+          <a:lstStyle/>
+          <a:p>
+            <a:r>
+              <a:rPr lang="es-PE" dirty="0" smtClean="0">
+                <a:solidFill>
+                  <a:srgbClr val="FFC000"/>
+                </a:solidFill>
+              </a:rPr>
+              <a:t>Ejercicio </a:t>
+            </a:r>
+            <a:r>
+              <a:rPr lang="es-PE" dirty="0" smtClean="0">
+                <a:solidFill>
+                  <a:srgbClr val="00823B"/>
+                </a:solidFill>
+              </a:rPr>
+              <a:t/>
+            </a:r>
+            <a:br>
+              <a:rPr lang="es-PE" dirty="0" smtClean="0">
+                <a:solidFill>
+                  <a:srgbClr val="00823B"/>
+                </a:solidFill>
+              </a:rPr>
+            </a:br>
+            <a:r>
+              <a:rPr lang="es-PE" dirty="0" smtClean="0">
+                <a:solidFill>
+                  <a:srgbClr val="00823B"/>
+                </a:solidFill>
+              </a:rPr>
+              <a:t>Aplicando </a:t>
+            </a:r>
+            <a:r>
+              <a:rPr lang="es-PE" dirty="0" err="1" smtClean="0">
+                <a:solidFill>
+                  <a:srgbClr val="00823B"/>
+                </a:solidFill>
+              </a:rPr>
+              <a:t>Refactorings</a:t>
+            </a:r>
+            <a:r>
+              <a:rPr lang="es-PE" dirty="0" smtClean="0">
+                <a:solidFill>
+                  <a:srgbClr val="00823B"/>
+                </a:solidFill>
+              </a:rPr>
+              <a:t> </a:t>
+            </a:r>
+            <a:br>
+              <a:rPr lang="es-PE" dirty="0" smtClean="0">
+                <a:solidFill>
+                  <a:srgbClr val="00823B"/>
+                </a:solidFill>
+              </a:rPr>
+            </a:br>
+            <a:r>
+              <a:rPr lang="es-PE" dirty="0" smtClean="0">
+                <a:solidFill>
+                  <a:srgbClr val="00823B"/>
+                </a:solidFill>
+              </a:rPr>
+              <a:t>sobre Código </a:t>
+            </a:r>
+            <a:endParaRPr lang="es-PE" dirty="0">
+              <a:solidFill>
+                <a:srgbClr val="00823B"/>
+              </a:solidFill>
+            </a:endParaRPr>
+          </a:p>
+        </p:txBody>
+      </p:sp>
+      <p:sp>
+        <p:nvSpPr>
+          <p:cNvPr id="4" name="3 CuadroTexto"/>
+          <p:cNvSpPr txBox="1"/>
+          <p:nvPr/>
+        </p:nvSpPr>
+        <p:spPr>
+          <a:xfrm>
+            <a:off x="323529" y="2636912"/>
+            <a:ext cx="8496944" cy="461665"/>
+          </a:xfrm>
+          <a:prstGeom prst="rect">
+            <a:avLst/>
+          </a:prstGeom>
+          <a:noFill/>
+        </p:spPr>
+        <p:txBody>
+          <a:bodyPr wrap="square" rtlCol="0">
+            <a:spAutoFit/>
+          </a:bodyPr>
+          <a:lstStyle/>
+          <a:p>
+            <a:r>
+              <a:rPr lang="es-PE" sz="2400" i="1" dirty="0" smtClean="0"/>
+              <a:t>……</a:t>
+            </a:r>
+            <a:endParaRPr lang="es-PE" sz="2400" i="1" dirty="0" smtClean="0"/>
+          </a:p>
+        </p:txBody>
+      </p:sp>
+    </p:spTree>
+    <p:extLst>
+      <p:ext uri="{BB962C8B-B14F-4D97-AF65-F5344CB8AC3E}">
+        <p14:creationId xmlns:p14="http://schemas.microsoft.com/office/powerpoint/2010/main" val="1541523818"/>
       </p:ext>
     </p:extLst>
   </p:cSld>
@@ -24799,6 +24959,544 @@
       </p:grpSpPr>
       <p:sp>
         <p:nvSpPr>
+          <p:cNvPr id="5" name="4 CuadroTexto"/>
+          <p:cNvSpPr txBox="1"/>
+          <p:nvPr/>
+        </p:nvSpPr>
+        <p:spPr>
+          <a:xfrm>
+            <a:off x="446856" y="2276872"/>
+            <a:ext cx="8445623" cy="3046988"/>
+          </a:xfrm>
+          <a:prstGeom prst="rect">
+            <a:avLst/>
+          </a:prstGeom>
+          <a:noFill/>
+        </p:spPr>
+        <p:txBody>
+          <a:bodyPr wrap="square" rtlCol="0">
+            <a:spAutoFit/>
+          </a:bodyPr>
+          <a:lstStyle/>
+          <a:p>
+            <a:r>
+              <a:rPr lang="es-PE" sz="2400" dirty="0" smtClean="0"/>
+              <a:t>Necesitamos revertir un </a:t>
+            </a:r>
+            <a:r>
+              <a:rPr lang="es-PE" sz="2400" dirty="0" smtClean="0"/>
+              <a:t>R</a:t>
+            </a:r>
+            <a:r>
+              <a:rPr lang="es-PE" sz="2400" dirty="0" smtClean="0"/>
+              <a:t>efactoring cuando:</a:t>
+            </a:r>
+          </a:p>
+          <a:p>
+            <a:pPr marL="342900" indent="-342900">
+              <a:buFont typeface="Arial" pitchFamily="34" charset="0"/>
+              <a:buChar char="•"/>
+            </a:pPr>
+            <a:r>
+              <a:rPr lang="es-PE" sz="2400" dirty="0" smtClean="0"/>
+              <a:t>H</a:t>
+            </a:r>
+            <a:r>
+              <a:rPr lang="es-PE" sz="2400" dirty="0" smtClean="0"/>
+              <a:t>emos realizado un paso muy grande que ha producido errores</a:t>
+            </a:r>
+          </a:p>
+          <a:p>
+            <a:pPr marL="342900" indent="-342900">
+              <a:buFont typeface="Arial" pitchFamily="34" charset="0"/>
+              <a:buChar char="•"/>
+            </a:pPr>
+            <a:r>
+              <a:rPr lang="es-PE" sz="2400" dirty="0" smtClean="0"/>
+              <a:t>Un cambio  que era bueno hoy ya no parece tan bueno para mañana.</a:t>
+            </a:r>
+          </a:p>
+          <a:p>
+            <a:pPr marL="342900" indent="-342900">
+              <a:buFont typeface="Arial" pitchFamily="34" charset="0"/>
+              <a:buChar char="•"/>
+            </a:pPr>
+            <a:endParaRPr lang="es-PE" sz="2400" dirty="0" smtClean="0"/>
+          </a:p>
+          <a:p>
+            <a:pPr algn="ctr"/>
+            <a:r>
+              <a:rPr lang="es-PE" sz="2400" dirty="0" smtClean="0"/>
+              <a:t>En parejas, para cada uno de los </a:t>
+            </a:r>
+            <a:r>
+              <a:rPr lang="es-PE" sz="2400" dirty="0" err="1" smtClean="0"/>
+              <a:t>Refactorings</a:t>
+            </a:r>
+            <a:r>
+              <a:rPr lang="es-PE" sz="2400" dirty="0" smtClean="0"/>
+              <a:t> que se entregarán a continuación, </a:t>
+            </a:r>
+            <a:r>
+              <a:rPr lang="es-PE" sz="2400" dirty="0" err="1" smtClean="0"/>
+              <a:t>identifca</a:t>
+            </a:r>
+            <a:r>
+              <a:rPr lang="es-PE" sz="2400" dirty="0" smtClean="0"/>
+              <a:t> cuál es el nombre del </a:t>
+            </a:r>
+            <a:r>
+              <a:rPr lang="es-PE" sz="2400" dirty="0" err="1" smtClean="0"/>
+              <a:t>refactoring</a:t>
+            </a:r>
+            <a:r>
+              <a:rPr lang="es-PE" sz="2400" dirty="0" smtClean="0"/>
+              <a:t> que revierte su cambio.</a:t>
+            </a:r>
+            <a:endParaRPr lang="es-PE" sz="2400" dirty="0" smtClean="0"/>
+          </a:p>
+        </p:txBody>
+      </p:sp>
+      <p:sp>
+        <p:nvSpPr>
+          <p:cNvPr id="6" name="2 Título"/>
+          <p:cNvSpPr txBox="1">
+            <a:spLocks/>
+          </p:cNvSpPr>
+          <p:nvPr/>
+        </p:nvSpPr>
+        <p:spPr bwMode="auto">
+          <a:xfrm>
+            <a:off x="446856" y="395372"/>
+            <a:ext cx="8229600" cy="1377444"/>
+          </a:xfrm>
+          <a:prstGeom prst="rect">
+            <a:avLst/>
+          </a:prstGeom>
+          <a:noFill/>
+          <a:ln w="9525">
+            <a:noFill/>
+            <a:miter lim="800000"/>
+            <a:headEnd/>
+            <a:tailEnd/>
+          </a:ln>
+        </p:spPr>
+        <p:txBody>
+          <a:bodyPr vert="horz" wrap="square" lIns="91440" tIns="45720" rIns="91440" bIns="45720" numCol="1" anchor="ctr" anchorCtr="0" compatLnSpc="1">
+            <a:prstTxWarp prst="textNoShape">
+              <a:avLst/>
+            </a:prstTxWarp>
+          </a:bodyPr>
+          <a:lstStyle>
+            <a:lvl1pPr algn="ctr" rtl="0" eaLnBrk="1" fontAlgn="base" hangingPunct="1">
+              <a:spcBef>
+                <a:spcPct val="0"/>
+              </a:spcBef>
+              <a:spcAft>
+                <a:spcPct val="0"/>
+              </a:spcAft>
+              <a:defRPr sz="4400" kern="1200">
+                <a:solidFill>
+                  <a:schemeClr val="tx1"/>
+                </a:solidFill>
+                <a:latin typeface="+mj-lt"/>
+                <a:ea typeface="+mj-ea"/>
+                <a:cs typeface="+mj-cs"/>
+              </a:defRPr>
+            </a:lvl1pPr>
+            <a:lvl2pPr algn="ctr" rtl="0" eaLnBrk="1" fontAlgn="base" hangingPunct="1">
+              <a:spcBef>
+                <a:spcPct val="0"/>
+              </a:spcBef>
+              <a:spcAft>
+                <a:spcPct val="0"/>
+              </a:spcAft>
+              <a:defRPr sz="4400">
+                <a:solidFill>
+                  <a:schemeClr val="tx1"/>
+                </a:solidFill>
+                <a:latin typeface="Calibri" pitchFamily="34" charset="0"/>
+              </a:defRPr>
+            </a:lvl2pPr>
+            <a:lvl3pPr algn="ctr" rtl="0" eaLnBrk="1" fontAlgn="base" hangingPunct="1">
+              <a:spcBef>
+                <a:spcPct val="0"/>
+              </a:spcBef>
+              <a:spcAft>
+                <a:spcPct val="0"/>
+              </a:spcAft>
+              <a:defRPr sz="4400">
+                <a:solidFill>
+                  <a:schemeClr val="tx1"/>
+                </a:solidFill>
+                <a:latin typeface="Calibri" pitchFamily="34" charset="0"/>
+              </a:defRPr>
+            </a:lvl3pPr>
+            <a:lvl4pPr algn="ctr" rtl="0" eaLnBrk="1" fontAlgn="base" hangingPunct="1">
+              <a:spcBef>
+                <a:spcPct val="0"/>
+              </a:spcBef>
+              <a:spcAft>
+                <a:spcPct val="0"/>
+              </a:spcAft>
+              <a:defRPr sz="4400">
+                <a:solidFill>
+                  <a:schemeClr val="tx1"/>
+                </a:solidFill>
+                <a:latin typeface="Calibri" pitchFamily="34" charset="0"/>
+              </a:defRPr>
+            </a:lvl4pPr>
+            <a:lvl5pPr algn="ctr" rtl="0" eaLnBrk="1" fontAlgn="base" hangingPunct="1">
+              <a:spcBef>
+                <a:spcPct val="0"/>
+              </a:spcBef>
+              <a:spcAft>
+                <a:spcPct val="0"/>
+              </a:spcAft>
+              <a:defRPr sz="4400">
+                <a:solidFill>
+                  <a:schemeClr val="tx1"/>
+                </a:solidFill>
+                <a:latin typeface="Calibri" pitchFamily="34" charset="0"/>
+              </a:defRPr>
+            </a:lvl5pPr>
+            <a:lvl6pPr marL="457200" algn="ctr" rtl="0" eaLnBrk="1" fontAlgn="base" hangingPunct="1">
+              <a:spcBef>
+                <a:spcPct val="0"/>
+              </a:spcBef>
+              <a:spcAft>
+                <a:spcPct val="0"/>
+              </a:spcAft>
+              <a:defRPr sz="4400">
+                <a:solidFill>
+                  <a:schemeClr val="tx1"/>
+                </a:solidFill>
+                <a:latin typeface="Calibri" pitchFamily="34" charset="0"/>
+              </a:defRPr>
+            </a:lvl6pPr>
+            <a:lvl7pPr marL="914400" algn="ctr" rtl="0" eaLnBrk="1" fontAlgn="base" hangingPunct="1">
+              <a:spcBef>
+                <a:spcPct val="0"/>
+              </a:spcBef>
+              <a:spcAft>
+                <a:spcPct val="0"/>
+              </a:spcAft>
+              <a:defRPr sz="4400">
+                <a:solidFill>
+                  <a:schemeClr val="tx1"/>
+                </a:solidFill>
+                <a:latin typeface="Calibri" pitchFamily="34" charset="0"/>
+              </a:defRPr>
+            </a:lvl7pPr>
+            <a:lvl8pPr marL="1371600" algn="ctr" rtl="0" eaLnBrk="1" fontAlgn="base" hangingPunct="1">
+              <a:spcBef>
+                <a:spcPct val="0"/>
+              </a:spcBef>
+              <a:spcAft>
+                <a:spcPct val="0"/>
+              </a:spcAft>
+              <a:defRPr sz="4400">
+                <a:solidFill>
+                  <a:schemeClr val="tx1"/>
+                </a:solidFill>
+                <a:latin typeface="Calibri" pitchFamily="34" charset="0"/>
+              </a:defRPr>
+            </a:lvl8pPr>
+            <a:lvl9pPr marL="1828800" algn="ctr" rtl="0" eaLnBrk="1" fontAlgn="base" hangingPunct="1">
+              <a:spcBef>
+                <a:spcPct val="0"/>
+              </a:spcBef>
+              <a:spcAft>
+                <a:spcPct val="0"/>
+              </a:spcAft>
+              <a:defRPr sz="4400">
+                <a:solidFill>
+                  <a:schemeClr val="tx1"/>
+                </a:solidFill>
+                <a:latin typeface="Calibri" pitchFamily="34" charset="0"/>
+              </a:defRPr>
+            </a:lvl9pPr>
+          </a:lstStyle>
+          <a:p>
+            <a:r>
+              <a:rPr lang="es-PE" dirty="0" smtClean="0">
+                <a:solidFill>
+                  <a:srgbClr val="FFC000"/>
+                </a:solidFill>
+              </a:rPr>
+              <a:t>Ejercicio </a:t>
+            </a:r>
+            <a:r>
+              <a:rPr lang="es-PE" dirty="0" smtClean="0">
+                <a:solidFill>
+                  <a:srgbClr val="00823B"/>
+                </a:solidFill>
+              </a:rPr>
+              <a:t/>
+            </a:r>
+            <a:br>
+              <a:rPr lang="es-PE" dirty="0" smtClean="0">
+                <a:solidFill>
+                  <a:srgbClr val="00823B"/>
+                </a:solidFill>
+              </a:rPr>
+            </a:br>
+            <a:r>
+              <a:rPr lang="es-PE" dirty="0" smtClean="0">
+                <a:solidFill>
+                  <a:srgbClr val="00823B"/>
+                </a:solidFill>
+              </a:rPr>
+              <a:t>Entendiendo Más </a:t>
+            </a:r>
+            <a:r>
+              <a:rPr lang="es-PE" dirty="0" err="1" smtClean="0">
+                <a:solidFill>
+                  <a:srgbClr val="00823B"/>
+                </a:solidFill>
+              </a:rPr>
+              <a:t>Refactorings</a:t>
+            </a:r>
+            <a:endParaRPr lang="es-PE" dirty="0">
+              <a:solidFill>
+                <a:srgbClr val="00823B"/>
+              </a:solidFill>
+            </a:endParaRPr>
+          </a:p>
+        </p:txBody>
+      </p:sp>
+    </p:spTree>
+    <p:extLst>
+      <p:ext uri="{BB962C8B-B14F-4D97-AF65-F5344CB8AC3E}">
+        <p14:creationId xmlns:p14="http://schemas.microsoft.com/office/powerpoint/2010/main" val="3222784279"/>
+      </p:ext>
+    </p:extLst>
+  </p:cSld>
+  <p:clrMapOvr>
+    <a:masterClrMapping/>
+  </p:clrMapOvr>
+  <p:timing>
+    <p:tnLst>
+      <p:par>
+        <p:cTn id="1" dur="indefinite" restart="never" nodeType="tmRoot"/>
+      </p:par>
+    </p:tnLst>
+  </p:timing>
+</p:sld>
+</file>
+
+<file path=ppt/slides/slide54.xml><?xml version="1.0" encoding="utf-8"?>
+<p:sld xmlns:a="http://schemas.openxmlformats.org/drawingml/2006/main" xmlns:r="http://schemas.openxmlformats.org/officeDocument/2006/relationships" xmlns:p="http://schemas.openxmlformats.org/presentationml/2006/main">
+  <p:cSld>
+    <p:spTree>
+      <p:nvGrpSpPr>
+        <p:cNvPr id="1" name=""/>
+        <p:cNvGrpSpPr/>
+        <p:nvPr/>
+      </p:nvGrpSpPr>
+      <p:grpSpPr>
+        <a:xfrm>
+          <a:off x="0" y="0"/>
+          <a:ext cx="0" cy="0"/>
+          <a:chOff x="0" y="0"/>
+          <a:chExt cx="0" cy="0"/>
+        </a:xfrm>
+      </p:grpSpPr>
+      <p:sp>
+        <p:nvSpPr>
+          <p:cNvPr id="3" name="2 Título"/>
+          <p:cNvSpPr>
+            <a:spLocks noGrp="1"/>
+          </p:cNvSpPr>
+          <p:nvPr>
+            <p:ph type="title"/>
+          </p:nvPr>
+        </p:nvSpPr>
+        <p:spPr>
+          <a:xfrm>
+            <a:off x="446856" y="260648"/>
+            <a:ext cx="8229600" cy="2088232"/>
+          </a:xfrm>
+        </p:spPr>
+        <p:txBody>
+          <a:bodyPr/>
+          <a:lstStyle/>
+          <a:p>
+            <a:r>
+              <a:rPr lang="es-PE" dirty="0" smtClean="0">
+                <a:solidFill>
+                  <a:srgbClr val="FFC000"/>
+                </a:solidFill>
+              </a:rPr>
+              <a:t>Ejercicio </a:t>
+            </a:r>
+            <a:r>
+              <a:rPr lang="es-PE" dirty="0" smtClean="0">
+                <a:solidFill>
+                  <a:srgbClr val="00823B"/>
+                </a:solidFill>
+              </a:rPr>
+              <a:t/>
+            </a:r>
+            <a:br>
+              <a:rPr lang="es-PE" dirty="0" smtClean="0">
+                <a:solidFill>
+                  <a:srgbClr val="00823B"/>
+                </a:solidFill>
+              </a:rPr>
+            </a:br>
+            <a:r>
+              <a:rPr lang="es-PE" dirty="0" smtClean="0">
+                <a:solidFill>
+                  <a:srgbClr val="00823B"/>
+                </a:solidFill>
+              </a:rPr>
+              <a:t>Aprendiendo a usar las Herramientas de Refactoring</a:t>
+            </a:r>
+            <a:endParaRPr lang="es-PE" dirty="0">
+              <a:solidFill>
+                <a:srgbClr val="00823B"/>
+              </a:solidFill>
+            </a:endParaRPr>
+          </a:p>
+        </p:txBody>
+      </p:sp>
+      <p:sp>
+        <p:nvSpPr>
+          <p:cNvPr id="4" name="3 CuadroTexto"/>
+          <p:cNvSpPr txBox="1"/>
+          <p:nvPr/>
+        </p:nvSpPr>
+        <p:spPr>
+          <a:xfrm>
+            <a:off x="323529" y="2636912"/>
+            <a:ext cx="8496944" cy="3046988"/>
+          </a:xfrm>
+          <a:prstGeom prst="rect">
+            <a:avLst/>
+          </a:prstGeom>
+          <a:noFill/>
+        </p:spPr>
+        <p:txBody>
+          <a:bodyPr wrap="square" rtlCol="0">
+            <a:spAutoFit/>
+          </a:bodyPr>
+          <a:lstStyle/>
+          <a:p>
+            <a:pPr marL="285750" indent="-285750">
+              <a:buFont typeface="Arial" pitchFamily="34" charset="0"/>
+              <a:buChar char="•"/>
+            </a:pPr>
+            <a:r>
+              <a:rPr lang="es-PE" sz="2400" i="1" dirty="0" smtClean="0"/>
+              <a:t>Refactoring</a:t>
+            </a:r>
+            <a:r>
+              <a:rPr lang="es-PE" sz="2400" dirty="0" smtClean="0"/>
+              <a:t> es realizar cambios en el código para mejorar la calidad interna.</a:t>
+            </a:r>
+          </a:p>
+          <a:p>
+            <a:pPr marL="285750" indent="-285750">
+              <a:buFont typeface="Arial" pitchFamily="34" charset="0"/>
+              <a:buChar char="•"/>
+            </a:pPr>
+            <a:endParaRPr lang="es-PE" sz="2400" dirty="0" smtClean="0"/>
+          </a:p>
+          <a:p>
+            <a:pPr marL="285750" indent="-285750">
+              <a:buFont typeface="Arial" pitchFamily="34" charset="0"/>
+              <a:buChar char="•"/>
+            </a:pPr>
+            <a:r>
+              <a:rPr lang="es-PE" sz="2400" i="1" dirty="0" err="1" smtClean="0"/>
+              <a:t>Refuctoring</a:t>
+            </a:r>
+            <a:r>
+              <a:rPr lang="es-PE" sz="2400" dirty="0" smtClean="0"/>
+              <a:t> es tomar un código bien diseñado, realizar una serie cambios, hasta hacerlo </a:t>
+            </a:r>
+            <a:r>
+              <a:rPr lang="es-PE" sz="2400" dirty="0" err="1" smtClean="0"/>
+              <a:t>inmantenible</a:t>
+            </a:r>
+            <a:r>
+              <a:rPr lang="es-PE" sz="2400" dirty="0" smtClean="0"/>
+              <a:t>.</a:t>
+            </a:r>
+          </a:p>
+          <a:p>
+            <a:pPr marL="285750" indent="-285750">
+              <a:buFont typeface="Arial" pitchFamily="34" charset="0"/>
+              <a:buChar char="•"/>
+            </a:pPr>
+            <a:endParaRPr lang="es-PE" sz="2400" dirty="0" smtClean="0"/>
+          </a:p>
+          <a:p>
+            <a:pPr algn="ctr"/>
+            <a:r>
+              <a:rPr lang="es-PE" sz="2400" dirty="0" smtClean="0"/>
+              <a:t>Vamos a identificar y practicar las herramientas automatizadas, </a:t>
+            </a:r>
+            <a:r>
+              <a:rPr lang="es-PE" sz="2400" dirty="0" err="1" smtClean="0"/>
+              <a:t>refuctorizando</a:t>
+            </a:r>
+            <a:r>
+              <a:rPr lang="es-PE" sz="2400" dirty="0" smtClean="0"/>
+              <a:t> un simple: </a:t>
+            </a:r>
+            <a:r>
+              <a:rPr lang="es-PE" sz="2400" i="1" dirty="0" err="1" smtClean="0"/>
+              <a:t>return</a:t>
+            </a:r>
+            <a:r>
+              <a:rPr lang="es-PE" sz="2400" i="1" dirty="0" smtClean="0"/>
+              <a:t> "Hola Mundo".</a:t>
+            </a:r>
+            <a:endParaRPr lang="es-PE" sz="2400" i="1" dirty="0" smtClean="0"/>
+          </a:p>
+        </p:txBody>
+      </p:sp>
+    </p:spTree>
+    <p:extLst>
+      <p:ext uri="{BB962C8B-B14F-4D97-AF65-F5344CB8AC3E}">
+        <p14:creationId xmlns:p14="http://schemas.microsoft.com/office/powerpoint/2010/main" val="2451066504"/>
+      </p:ext>
+    </p:extLst>
+  </p:cSld>
+  <p:clrMapOvr>
+    <a:masterClrMapping/>
+  </p:clrMapOvr>
+  <p:timing>
+    <p:tnLst>
+      <p:par>
+        <p:cTn id="1" dur="indefinite" restart="never" nodeType="tmRoot"/>
+      </p:par>
+    </p:tnLst>
+  </p:timing>
+</p:sld>
+</file>
+
+<file path=ppt/slides/slide55.xml><?xml version="1.0" encoding="utf-8"?>
+<p:sld xmlns:a="http://schemas.openxmlformats.org/drawingml/2006/main" xmlns:r="http://schemas.openxmlformats.org/officeDocument/2006/relationships" xmlns:p="http://schemas.openxmlformats.org/presentationml/2006/main">
+  <p:cSld>
+    <p:spTree>
+      <p:nvGrpSpPr>
+        <p:cNvPr id="1" name=""/>
+        <p:cNvGrpSpPr/>
+        <p:nvPr/>
+      </p:nvGrpSpPr>
+      <p:grpSpPr>
+        <a:xfrm>
+          <a:off x="0" y="0"/>
+          <a:ext cx="0" cy="0"/>
+          <a:chOff x="0" y="0"/>
+          <a:chExt cx="0" cy="0"/>
+        </a:xfrm>
+      </p:grpSpPr>
+      <p:sp>
+        <p:nvSpPr>
           <p:cNvPr id="3" name="2 Título"/>
           <p:cNvSpPr>
             <a:spLocks noGrp="1"/>
@@ -24908,7 +25606,7 @@
 </p:sld>
 </file>
 
-<file path=ppt/slides/slide54.xml><?xml version="1.0" encoding="utf-8"?>
+<file path=ppt/slides/slide56.xml><?xml version="1.0" encoding="utf-8"?>
 <p:sld xmlns:a="http://schemas.openxmlformats.org/drawingml/2006/main" xmlns:r="http://schemas.openxmlformats.org/officeDocument/2006/relationships" xmlns:p="http://schemas.openxmlformats.org/presentationml/2006/main">
   <p:cSld>
     <p:spTree>

</xml_diff>

<commit_message>
Documentos como Alumno y Profesor
Se separaron los documentos en 2 directorios para poder imprimirlos más
facilmente
</commit_message>
<xml_diff>
--- a/Diapositivas/Code Smells and Refactoring.pptx
+++ b/Diapositivas/Code Smells and Refactoring.pptx
@@ -170,7 +170,22 @@
       </a:defRPr>
     </a:lvl9pPr>
   </p:defaultTextStyle>
-  <p:extLst/>
+  <p:extLst>
+    <p:ext uri="{EFAFB233-063F-42B5-8137-9DF3F51BA10A}">
+      <p15:sldGuideLst xmlns:p15="http://schemas.microsoft.com/office/powerpoint/2012/main">
+        <p15:guide id="1" orient="horz" pos="2160">
+          <p15:clr>
+            <a:srgbClr val="A4A3A4"/>
+          </p15:clr>
+        </p15:guide>
+        <p15:guide id="2" pos="2880">
+          <p15:clr>
+            <a:srgbClr val="A4A3A4"/>
+          </p15:clr>
+        </p15:guide>
+      </p15:sldGuideLst>
+    </p:ext>
+  </p:extLst>
 </p:presentation>
 </file>
 
@@ -2107,8 +2122,8 @@
     <dgm:cxn modelId="{F2AB151D-21B9-4D2B-A657-006D73F49BC8}" type="presOf" srcId="{9768ADBD-E274-445C-8DCD-B40B42EBD27B}" destId="{2CCF0EC0-5E87-4702-9012-7254A3821684}" srcOrd="0" destOrd="0" presId="urn:microsoft.com/office/officeart/2005/8/layout/cycle2"/>
     <dgm:cxn modelId="{4B86B7C8-E32E-4E93-BEB0-78CDA56678D2}" type="presOf" srcId="{76A1EA92-51E5-49EB-A181-D50B98697B05}" destId="{FB6A06C4-A2A0-4F93-829D-27E882A8B839}" srcOrd="0" destOrd="0" presId="urn:microsoft.com/office/officeart/2005/8/layout/cycle2"/>
     <dgm:cxn modelId="{1089786B-FC8F-44D2-845E-383202AFE628}" type="presOf" srcId="{3766CEFC-D74E-4FC6-B9BD-CE4F3847A8F1}" destId="{B4DAEDC5-1010-434A-AA93-DB22F5A7CB1E}" srcOrd="1" destOrd="0" presId="urn:microsoft.com/office/officeart/2005/8/layout/cycle2"/>
+    <dgm:cxn modelId="{9E7B1AD0-4B2E-401B-B82A-F21921E14474}" srcId="{AA37C565-8227-47BE-938D-F0254EF29510}" destId="{7EB66F7D-EDF6-4CF9-8307-CDC396A315D2}" srcOrd="3" destOrd="0" parTransId="{1C435CE0-1330-4C41-B432-980635612D78}" sibTransId="{3766CEFC-D74E-4FC6-B9BD-CE4F3847A8F1}"/>
     <dgm:cxn modelId="{D7A616E2-9700-4CBA-9BBE-43444D8A6564}" type="presOf" srcId="{17CA2C55-0354-4402-9601-202C7F5A5539}" destId="{6552A34E-30A2-429F-881E-FE5C4BE2A18D}" srcOrd="1" destOrd="0" presId="urn:microsoft.com/office/officeart/2005/8/layout/cycle2"/>
-    <dgm:cxn modelId="{9E7B1AD0-4B2E-401B-B82A-F21921E14474}" srcId="{AA37C565-8227-47BE-938D-F0254EF29510}" destId="{7EB66F7D-EDF6-4CF9-8307-CDC396A315D2}" srcOrd="3" destOrd="0" parTransId="{1C435CE0-1330-4C41-B432-980635612D78}" sibTransId="{3766CEFC-D74E-4FC6-B9BD-CE4F3847A8F1}"/>
     <dgm:cxn modelId="{D953A32C-4D27-4AB5-8837-349E35D4EC32}" type="presOf" srcId="{86434053-B40A-4DA1-AC86-B95A2468B2D6}" destId="{B4181A90-3A21-4F79-83DB-5F7E138E1000}" srcOrd="0" destOrd="0" presId="urn:microsoft.com/office/officeart/2005/8/layout/cycle2"/>
     <dgm:cxn modelId="{9476F479-5E75-4A48-B836-A1328D3E5B65}" type="presOf" srcId="{2D629D79-084D-4FF9-8DF9-08F54FFF92DE}" destId="{8D88EC16-041F-468E-A4EE-B0C17C298D88}" srcOrd="0" destOrd="0" presId="urn:microsoft.com/office/officeart/2005/8/layout/cycle2"/>
     <dgm:cxn modelId="{E4C3E423-9E5F-4380-80CE-AA5DD2EC4561}" type="presOf" srcId="{17CA2C55-0354-4402-9601-202C7F5A5539}" destId="{19C3351F-DE4C-4425-8FAE-716FD4A6218E}" srcOrd="0" destOrd="0" presId="urn:microsoft.com/office/officeart/2005/8/layout/cycle2"/>
@@ -2487,17 +2502,29 @@
       <dsp:cNvGrpSpPr/>
     </dsp:nvGrpSpPr>
     <dsp:grpSpPr/>
-    <dsp:sp modelId="{8D88EC16-041F-468E-A4EE-B0C17C298D88}">
+  </dsp:spTree>
+</dsp:drawing>
+</file>
+
+<file path=ppt/diagrams/drawing2.xml><?xml version="1.0" encoding="utf-8"?>
+<dsp:drawing xmlns:dgm="http://schemas.openxmlformats.org/drawingml/2006/diagram" xmlns:dsp="http://schemas.microsoft.com/office/drawing/2008/diagram" xmlns:a="http://schemas.openxmlformats.org/drawingml/2006/main">
+  <dsp:spTree>
+    <dsp:nvGrpSpPr>
+      <dsp:cNvPr id="0" name=""/>
+      <dsp:cNvGrpSpPr/>
+    </dsp:nvGrpSpPr>
+    <dsp:grpSpPr/>
+    <dsp:sp modelId="{24CAC893-EE9B-4D01-BB90-0CB36FFE22ED}">
       <dsp:nvSpPr>
         <dsp:cNvPr id="0" name=""/>
         <dsp:cNvSpPr/>
       </dsp:nvSpPr>
       <dsp:spPr>
         <a:xfrm>
-          <a:off x="2435537" y="1584"/>
-          <a:ext cx="1608925" cy="1608925"/>
+          <a:off x="3206" y="16090"/>
+          <a:ext cx="1816742" cy="726697"/>
         </a:xfrm>
-        <a:prstGeom prst="ellipse">
+        <a:prstGeom prst="homePlate">
           <a:avLst/>
         </a:prstGeom>
         <a:solidFill>
@@ -2536,7 +2563,7 @@
         </a:fontRef>
       </dsp:style>
       <dsp:txBody>
-        <a:bodyPr spcFirstLastPara="0" vert="horz" wrap="square" lIns="25400" tIns="25400" rIns="25400" bIns="25400" numCol="1" spcCol="1270" anchor="ctr" anchorCtr="0">
+        <a:bodyPr spcFirstLastPara="0" vert="horz" wrap="square" lIns="106680" tIns="53340" rIns="26670" bIns="53340" numCol="1" spcCol="1270" anchor="ctr" anchorCtr="0">
           <a:noAutofit/>
         </a:bodyPr>
         <a:lstStyle/>
@@ -2553,97 +2580,35 @@
             </a:spcAft>
           </a:pPr>
           <a:r>
-            <a:rPr lang="es-PE" sz="2000" kern="1200" noProof="0" smtClean="0"/>
-            <a:t>Tomar Deuda Técnica</a:t>
+            <a:rPr lang="es-PE" sz="2000" b="1" kern="1200" dirty="0" smtClean="0"/>
+            <a:t>Small </a:t>
           </a:r>
-          <a:endParaRPr lang="es-PE" sz="2000" kern="1200" noProof="0"/>
+          <a:br>
+            <a:rPr lang="es-PE" sz="2000" b="1" kern="1200" dirty="0" smtClean="0"/>
+          </a:br>
+          <a:r>
+            <a:rPr lang="es-PE" sz="2000" b="1" kern="1200" dirty="0" smtClean="0"/>
+            <a:t>Refactoring</a:t>
+          </a:r>
+          <a:endParaRPr lang="es-PE" sz="2000" b="1" kern="1200" dirty="0"/>
         </a:p>
       </dsp:txBody>
       <dsp:txXfrm>
-        <a:off x="2671159" y="237206"/>
-        <a:ext cx="1137681" cy="1137681"/>
+        <a:off x="3206" y="16090"/>
+        <a:ext cx="1635068" cy="726697"/>
       </dsp:txXfrm>
     </dsp:sp>
-    <dsp:sp modelId="{CED54BA0-F15B-4184-B79E-B8D2EC41BDAD}">
-      <dsp:nvSpPr>
-        <dsp:cNvPr id="0" name=""/>
-        <dsp:cNvSpPr/>
-      </dsp:nvSpPr>
-      <dsp:spPr>
-        <a:xfrm rot="2160000">
-          <a:off x="3993463" y="1237111"/>
-          <a:ext cx="427082" cy="543012"/>
-        </a:xfrm>
-        <a:prstGeom prst="rightArrow">
-          <a:avLst>
-            <a:gd name="adj1" fmla="val 60000"/>
-            <a:gd name="adj2" fmla="val 50000"/>
-          </a:avLst>
-        </a:prstGeom>
-        <a:solidFill>
-          <a:schemeClr val="accent1">
-            <a:tint val="60000"/>
-            <a:hueOff val="0"/>
-            <a:satOff val="0"/>
-            <a:lumOff val="0"/>
-            <a:alphaOff val="0"/>
-          </a:schemeClr>
-        </a:solidFill>
-        <a:ln>
-          <a:noFill/>
-        </a:ln>
-        <a:effectLst/>
-      </dsp:spPr>
-      <dsp:style>
-        <a:lnRef idx="0">
-          <a:scrgbClr r="0" g="0" b="0"/>
-        </a:lnRef>
-        <a:fillRef idx="1">
-          <a:scrgbClr r="0" g="0" b="0"/>
-        </a:fillRef>
-        <a:effectRef idx="0">
-          <a:scrgbClr r="0" g="0" b="0"/>
-        </a:effectRef>
-        <a:fontRef idx="minor">
-          <a:schemeClr val="lt1"/>
-        </a:fontRef>
-      </dsp:style>
-      <dsp:txBody>
-        <a:bodyPr spcFirstLastPara="0" vert="horz" wrap="square" lIns="0" tIns="0" rIns="0" bIns="0" numCol="1" spcCol="1270" anchor="ctr" anchorCtr="0">
-          <a:noAutofit/>
-        </a:bodyPr>
-        <a:lstStyle/>
-        <a:p>
-          <a:pPr lvl="0" algn="ctr" defTabSz="711200">
-            <a:lnSpc>
-              <a:spcPct val="90000"/>
-            </a:lnSpc>
-            <a:spcBef>
-              <a:spcPct val="0"/>
-            </a:spcBef>
-            <a:spcAft>
-              <a:spcPct val="35000"/>
-            </a:spcAft>
-          </a:pPr>
-          <a:endParaRPr lang="es-PE" sz="1600" kern="1200" noProof="0"/>
-        </a:p>
-      </dsp:txBody>
-      <dsp:txXfrm>
-        <a:off x="4005698" y="1308058"/>
-        <a:ext cx="298957" cy="325808"/>
-      </dsp:txXfrm>
-    </dsp:sp>
-    <dsp:sp modelId="{2CCF0EC0-5E87-4702-9012-7254A3821684}">
+    <dsp:sp modelId="{B5F9542A-6098-4FB8-BB83-B5125E571D9D}">
       <dsp:nvSpPr>
         <dsp:cNvPr id="0" name=""/>
         <dsp:cNvSpPr/>
       </dsp:nvSpPr>
       <dsp:spPr>
         <a:xfrm>
-          <a:off x="4389103" y="1420934"/>
-          <a:ext cx="1608925" cy="1608925"/>
+          <a:off x="1456600" y="16090"/>
+          <a:ext cx="1816742" cy="726697"/>
         </a:xfrm>
-        <a:prstGeom prst="ellipse">
+        <a:prstGeom prst="chevron">
           <a:avLst/>
         </a:prstGeom>
         <a:solidFill>
@@ -2682,7 +2647,7 @@
         </a:fontRef>
       </dsp:style>
       <dsp:txBody>
-        <a:bodyPr spcFirstLastPara="0" vert="horz" wrap="square" lIns="25400" tIns="25400" rIns="25400" bIns="25400" numCol="1" spcCol="1270" anchor="ctr" anchorCtr="0">
+        <a:bodyPr spcFirstLastPara="0" vert="horz" wrap="square" lIns="80010" tIns="53340" rIns="26670" bIns="53340" numCol="1" spcCol="1270" anchor="ctr" anchorCtr="0">
           <a:noAutofit/>
         </a:bodyPr>
         <a:lstStyle/>
@@ -2699,97 +2664,32 @@
             </a:spcAft>
           </a:pPr>
           <a:r>
-            <a:rPr lang="es-PE" sz="2000" kern="1200" noProof="0" smtClean="0"/>
-            <a:t>No pagar Duda Técnica</a:t>
+            <a:rPr lang="es-PE" sz="2000" b="1" kern="1200" dirty="0" err="1" smtClean="0"/>
+            <a:t>Run</a:t>
           </a:r>
-          <a:endParaRPr lang="es-PE" sz="2000" kern="1200" noProof="0"/>
+          <a:r>
+            <a:rPr lang="es-PE" sz="2000" b="1" kern="1200" dirty="0" smtClean="0"/>
+            <a:t> Test</a:t>
+          </a:r>
+          <a:endParaRPr lang="es-PE" sz="2000" b="1" kern="1200" dirty="0"/>
         </a:p>
       </dsp:txBody>
       <dsp:txXfrm>
-        <a:off x="4624725" y="1656556"/>
-        <a:ext cx="1137681" cy="1137681"/>
+        <a:off x="1819949" y="16090"/>
+        <a:ext cx="1090045" cy="726697"/>
       </dsp:txXfrm>
     </dsp:sp>
-    <dsp:sp modelId="{DCE9FE20-3966-495F-9530-23A38286FCDB}">
-      <dsp:nvSpPr>
-        <dsp:cNvPr id="0" name=""/>
-        <dsp:cNvSpPr/>
-      </dsp:nvSpPr>
-      <dsp:spPr>
-        <a:xfrm rot="6480000">
-          <a:off x="4610662" y="3090672"/>
-          <a:ext cx="427082" cy="543012"/>
-        </a:xfrm>
-        <a:prstGeom prst="rightArrow">
-          <a:avLst>
-            <a:gd name="adj1" fmla="val 60000"/>
-            <a:gd name="adj2" fmla="val 50000"/>
-          </a:avLst>
-        </a:prstGeom>
-        <a:solidFill>
-          <a:schemeClr val="accent1">
-            <a:tint val="60000"/>
-            <a:hueOff val="0"/>
-            <a:satOff val="0"/>
-            <a:lumOff val="0"/>
-            <a:alphaOff val="0"/>
-          </a:schemeClr>
-        </a:solidFill>
-        <a:ln>
-          <a:noFill/>
-        </a:ln>
-        <a:effectLst/>
-      </dsp:spPr>
-      <dsp:style>
-        <a:lnRef idx="0">
-          <a:scrgbClr r="0" g="0" b="0"/>
-        </a:lnRef>
-        <a:fillRef idx="1">
-          <a:scrgbClr r="0" g="0" b="0"/>
-        </a:fillRef>
-        <a:effectRef idx="0">
-          <a:scrgbClr r="0" g="0" b="0"/>
-        </a:effectRef>
-        <a:fontRef idx="minor">
-          <a:schemeClr val="lt1"/>
-        </a:fontRef>
-      </dsp:style>
-      <dsp:txBody>
-        <a:bodyPr spcFirstLastPara="0" vert="horz" wrap="square" lIns="0" tIns="0" rIns="0" bIns="0" numCol="1" spcCol="1270" anchor="ctr" anchorCtr="0">
-          <a:noAutofit/>
-        </a:bodyPr>
-        <a:lstStyle/>
-        <a:p>
-          <a:pPr lvl="0" algn="ctr" defTabSz="711200">
-            <a:lnSpc>
-              <a:spcPct val="90000"/>
-            </a:lnSpc>
-            <a:spcBef>
-              <a:spcPct val="0"/>
-            </a:spcBef>
-            <a:spcAft>
-              <a:spcPct val="35000"/>
-            </a:spcAft>
-          </a:pPr>
-          <a:endParaRPr lang="es-PE" sz="1600" kern="1200" noProof="0"/>
-        </a:p>
-      </dsp:txBody>
-      <dsp:txXfrm rot="10800000">
-        <a:off x="4694521" y="3138347"/>
-        <a:ext cx="298957" cy="325808"/>
-      </dsp:txXfrm>
-    </dsp:sp>
-    <dsp:sp modelId="{FB6A06C4-A2A0-4F93-829D-27E882A8B839}">
+    <dsp:sp modelId="{601A0D37-4256-4B03-929F-B3C0F426A913}">
       <dsp:nvSpPr>
         <dsp:cNvPr id="0" name=""/>
         <dsp:cNvSpPr/>
       </dsp:nvSpPr>
       <dsp:spPr>
         <a:xfrm>
-          <a:off x="3642907" y="3717489"/>
-          <a:ext cx="1608925" cy="1608925"/>
+          <a:off x="2909995" y="16090"/>
+          <a:ext cx="2172896" cy="726697"/>
         </a:xfrm>
-        <a:prstGeom prst="ellipse">
+        <a:prstGeom prst="chevron">
           <a:avLst/>
         </a:prstGeom>
         <a:solidFill>
@@ -2828,7 +2728,7 @@
         </a:fontRef>
       </dsp:style>
       <dsp:txBody>
-        <a:bodyPr spcFirstLastPara="0" vert="horz" wrap="square" lIns="25400" tIns="25400" rIns="25400" bIns="25400" numCol="1" spcCol="1270" anchor="ctr" anchorCtr="0">
+        <a:bodyPr spcFirstLastPara="0" vert="horz" wrap="square" lIns="80010" tIns="53340" rIns="26670" bIns="53340" numCol="1" spcCol="1270" anchor="ctr" anchorCtr="0">
           <a:noAutofit/>
         </a:bodyPr>
         <a:lstStyle/>
@@ -2845,97 +2745,28 @@
             </a:spcAft>
           </a:pPr>
           <a:r>
-            <a:rPr lang="es-PE" sz="2000" kern="1200" noProof="0" dirty="0" smtClean="0"/>
-            <a:t>Acumula la Deuda</a:t>
+            <a:rPr lang="es-PE" sz="2000" b="1" kern="1200" dirty="0" smtClean="0"/>
+            <a:t>Small Refactoring</a:t>
           </a:r>
-          <a:endParaRPr lang="es-PE" sz="2000" kern="1200" noProof="0" dirty="0"/>
+          <a:endParaRPr lang="es-PE" sz="2000" b="1" kern="1200" dirty="0"/>
         </a:p>
       </dsp:txBody>
       <dsp:txXfrm>
-        <a:off x="3878529" y="3953111"/>
-        <a:ext cx="1137681" cy="1137681"/>
+        <a:off x="3273344" y="16090"/>
+        <a:ext cx="1446199" cy="726697"/>
       </dsp:txXfrm>
     </dsp:sp>
-    <dsp:sp modelId="{F75A18FD-DF04-47F0-8AE8-A3F3E3B7ADA9}">
-      <dsp:nvSpPr>
-        <dsp:cNvPr id="0" name=""/>
-        <dsp:cNvSpPr/>
-      </dsp:nvSpPr>
-      <dsp:spPr>
-        <a:xfrm rot="10800000">
-          <a:off x="3038546" y="4250446"/>
-          <a:ext cx="427082" cy="543012"/>
-        </a:xfrm>
-        <a:prstGeom prst="rightArrow">
-          <a:avLst>
-            <a:gd name="adj1" fmla="val 60000"/>
-            <a:gd name="adj2" fmla="val 50000"/>
-          </a:avLst>
-        </a:prstGeom>
-        <a:solidFill>
-          <a:schemeClr val="accent1">
-            <a:tint val="60000"/>
-            <a:hueOff val="0"/>
-            <a:satOff val="0"/>
-            <a:lumOff val="0"/>
-            <a:alphaOff val="0"/>
-          </a:schemeClr>
-        </a:solidFill>
-        <a:ln>
-          <a:noFill/>
-        </a:ln>
-        <a:effectLst/>
-      </dsp:spPr>
-      <dsp:style>
-        <a:lnRef idx="0">
-          <a:scrgbClr r="0" g="0" b="0"/>
-        </a:lnRef>
-        <a:fillRef idx="1">
-          <a:scrgbClr r="0" g="0" b="0"/>
-        </a:fillRef>
-        <a:effectRef idx="0">
-          <a:scrgbClr r="0" g="0" b="0"/>
-        </a:effectRef>
-        <a:fontRef idx="minor">
-          <a:schemeClr val="lt1"/>
-        </a:fontRef>
-      </dsp:style>
-      <dsp:txBody>
-        <a:bodyPr spcFirstLastPara="0" vert="horz" wrap="square" lIns="0" tIns="0" rIns="0" bIns="0" numCol="1" spcCol="1270" anchor="ctr" anchorCtr="0">
-          <a:noAutofit/>
-        </a:bodyPr>
-        <a:lstStyle/>
-        <a:p>
-          <a:pPr lvl="0" algn="ctr" defTabSz="711200">
-            <a:lnSpc>
-              <a:spcPct val="90000"/>
-            </a:lnSpc>
-            <a:spcBef>
-              <a:spcPct val="0"/>
-            </a:spcBef>
-            <a:spcAft>
-              <a:spcPct val="35000"/>
-            </a:spcAft>
-          </a:pPr>
-          <a:endParaRPr lang="es-PE" sz="1600" kern="1200" noProof="0"/>
-        </a:p>
-      </dsp:txBody>
-      <dsp:txXfrm rot="10800000">
-        <a:off x="3166671" y="4359048"/>
-        <a:ext cx="298957" cy="325808"/>
-      </dsp:txXfrm>
-    </dsp:sp>
-    <dsp:sp modelId="{9C286F3C-FAF2-4FCF-B113-145FCACE16AA}">
+    <dsp:sp modelId="{28010DC8-3136-49BC-9983-7489D855A8B1}">
       <dsp:nvSpPr>
         <dsp:cNvPr id="0" name=""/>
         <dsp:cNvSpPr/>
       </dsp:nvSpPr>
       <dsp:spPr>
         <a:xfrm>
-          <a:off x="1228166" y="3717489"/>
-          <a:ext cx="1608925" cy="1608925"/>
+          <a:off x="4719543" y="16090"/>
+          <a:ext cx="1816742" cy="726697"/>
         </a:xfrm>
-        <a:prstGeom prst="ellipse">
+        <a:prstGeom prst="chevron">
           <a:avLst/>
         </a:prstGeom>
         <a:solidFill>
@@ -2974,7 +2805,7 @@
         </a:fontRef>
       </dsp:style>
       <dsp:txBody>
-        <a:bodyPr spcFirstLastPara="0" vert="horz" wrap="square" lIns="25400" tIns="25400" rIns="25400" bIns="25400" numCol="1" spcCol="1270" anchor="ctr" anchorCtr="0">
+        <a:bodyPr spcFirstLastPara="0" vert="horz" wrap="square" lIns="80010" tIns="53340" rIns="26670" bIns="53340" numCol="1" spcCol="1270" anchor="ctr" anchorCtr="0">
           <a:noAutofit/>
         </a:bodyPr>
         <a:lstStyle/>
@@ -2991,97 +2822,32 @@
             </a:spcAft>
           </a:pPr>
           <a:r>
-            <a:rPr lang="es-PE" sz="2000" kern="1200" noProof="0" dirty="0" smtClean="0"/>
-            <a:t>Disminuye Velocidad Equipo</a:t>
+            <a:rPr lang="es-PE" sz="2000" b="1" kern="1200" dirty="0" err="1" smtClean="0"/>
+            <a:t>Run</a:t>
           </a:r>
-          <a:endParaRPr lang="es-PE" sz="2000" kern="1200" noProof="0" dirty="0"/>
+          <a:r>
+            <a:rPr lang="es-PE" sz="2000" b="1" kern="1200" dirty="0" smtClean="0"/>
+            <a:t> Test</a:t>
+          </a:r>
+          <a:endParaRPr lang="es-PE" sz="2000" b="1" kern="1200" dirty="0"/>
         </a:p>
       </dsp:txBody>
       <dsp:txXfrm>
-        <a:off x="1463788" y="3953111"/>
-        <a:ext cx="1137681" cy="1137681"/>
+        <a:off x="5082892" y="16090"/>
+        <a:ext cx="1090045" cy="726697"/>
       </dsp:txXfrm>
     </dsp:sp>
-    <dsp:sp modelId="{4B49315F-91DD-4CBB-BA8F-EFE63A088439}">
-      <dsp:nvSpPr>
-        <dsp:cNvPr id="0" name=""/>
-        <dsp:cNvSpPr/>
-      </dsp:nvSpPr>
-      <dsp:spPr>
-        <a:xfrm rot="15120000">
-          <a:off x="1449725" y="3113664"/>
-          <a:ext cx="427082" cy="543012"/>
-        </a:xfrm>
-        <a:prstGeom prst="rightArrow">
-          <a:avLst>
-            <a:gd name="adj1" fmla="val 60000"/>
-            <a:gd name="adj2" fmla="val 50000"/>
-          </a:avLst>
-        </a:prstGeom>
-        <a:solidFill>
-          <a:schemeClr val="accent1">
-            <a:tint val="60000"/>
-            <a:hueOff val="0"/>
-            <a:satOff val="0"/>
-            <a:lumOff val="0"/>
-            <a:alphaOff val="0"/>
-          </a:schemeClr>
-        </a:solidFill>
-        <a:ln>
-          <a:noFill/>
-        </a:ln>
-        <a:effectLst/>
-      </dsp:spPr>
-      <dsp:style>
-        <a:lnRef idx="0">
-          <a:scrgbClr r="0" g="0" b="0"/>
-        </a:lnRef>
-        <a:fillRef idx="1">
-          <a:scrgbClr r="0" g="0" b="0"/>
-        </a:fillRef>
-        <a:effectRef idx="0">
-          <a:scrgbClr r="0" g="0" b="0"/>
-        </a:effectRef>
-        <a:fontRef idx="minor">
-          <a:schemeClr val="lt1"/>
-        </a:fontRef>
-      </dsp:style>
-      <dsp:txBody>
-        <a:bodyPr spcFirstLastPara="0" vert="horz" wrap="square" lIns="0" tIns="0" rIns="0" bIns="0" numCol="1" spcCol="1270" anchor="ctr" anchorCtr="0">
-          <a:noAutofit/>
-        </a:bodyPr>
-        <a:lstStyle/>
-        <a:p>
-          <a:pPr lvl="0" algn="ctr" defTabSz="711200">
-            <a:lnSpc>
-              <a:spcPct val="90000"/>
-            </a:lnSpc>
-            <a:spcBef>
-              <a:spcPct val="0"/>
-            </a:spcBef>
-            <a:spcAft>
-              <a:spcPct val="35000"/>
-            </a:spcAft>
-          </a:pPr>
-          <a:endParaRPr lang="es-PE" sz="1600" kern="1200" noProof="0"/>
-        </a:p>
-      </dsp:txBody>
-      <dsp:txXfrm rot="10800000">
-        <a:off x="1533584" y="3283193"/>
-        <a:ext cx="298957" cy="325808"/>
-      </dsp:txXfrm>
-    </dsp:sp>
-    <dsp:sp modelId="{B4181A90-3A21-4F79-83DB-5F7E138E1000}">
+    <dsp:sp modelId="{1DD64DFB-8EE0-41B5-B8F9-3F2D3C1A3C58}">
       <dsp:nvSpPr>
         <dsp:cNvPr id="0" name=""/>
         <dsp:cNvSpPr/>
       </dsp:nvSpPr>
       <dsp:spPr>
         <a:xfrm>
-          <a:off x="481970" y="1420934"/>
-          <a:ext cx="1608925" cy="1608925"/>
+          <a:off x="6172937" y="16090"/>
+          <a:ext cx="1816742" cy="726697"/>
         </a:xfrm>
-        <a:prstGeom prst="ellipse">
+        <a:prstGeom prst="chevron">
           <a:avLst/>
         </a:prstGeom>
         <a:solidFill>
@@ -3120,7 +2886,7 @@
         </a:fontRef>
       </dsp:style>
       <dsp:txBody>
-        <a:bodyPr spcFirstLastPara="0" vert="horz" wrap="square" lIns="25400" tIns="25400" rIns="25400" bIns="25400" numCol="1" spcCol="1270" anchor="ctr" anchorCtr="0">
+        <a:bodyPr spcFirstLastPara="0" vert="horz" wrap="square" lIns="80010" tIns="53340" rIns="26670" bIns="53340" numCol="1" spcCol="1270" anchor="ctr" anchorCtr="0">
           <a:noAutofit/>
         </a:bodyPr>
         <a:lstStyle/>
@@ -3137,105 +2903,17 @@
             </a:spcAft>
           </a:pPr>
           <a:r>
-            <a:rPr lang="es-PE" sz="2000" kern="1200" noProof="0" dirty="0" smtClean="0"/>
-            <a:t>(Más)</a:t>
+            <a:rPr lang="es-PE" sz="2000" b="1" kern="1200" dirty="0" smtClean="0"/>
+            <a:t>….</a:t>
           </a:r>
-          <a:br>
-            <a:rPr lang="es-PE" sz="2000" kern="1200" noProof="0" dirty="0" smtClean="0"/>
-          </a:br>
-          <a:r>
-            <a:rPr lang="es-PE" sz="2000" kern="1200" noProof="0" dirty="0" smtClean="0"/>
-            <a:t>Incesante Presión.</a:t>
-          </a:r>
-          <a:endParaRPr lang="es-PE" sz="2000" kern="1200" noProof="0" dirty="0"/>
+          <a:endParaRPr lang="es-PE" sz="2000" b="1" kern="1200" dirty="0"/>
         </a:p>
       </dsp:txBody>
       <dsp:txXfrm>
-        <a:off x="717592" y="1656556"/>
-        <a:ext cx="1137681" cy="1137681"/>
+        <a:off x="6536286" y="16090"/>
+        <a:ext cx="1090045" cy="726697"/>
       </dsp:txXfrm>
     </dsp:sp>
-    <dsp:sp modelId="{19C3351F-DE4C-4425-8FAE-716FD4A6218E}">
-      <dsp:nvSpPr>
-        <dsp:cNvPr id="0" name=""/>
-        <dsp:cNvSpPr/>
-      </dsp:nvSpPr>
-      <dsp:spPr>
-        <a:xfrm rot="19440000">
-          <a:off x="2039896" y="1251320"/>
-          <a:ext cx="427082" cy="543012"/>
-        </a:xfrm>
-        <a:prstGeom prst="rightArrow">
-          <a:avLst>
-            <a:gd name="adj1" fmla="val 60000"/>
-            <a:gd name="adj2" fmla="val 50000"/>
-          </a:avLst>
-        </a:prstGeom>
-        <a:solidFill>
-          <a:schemeClr val="accent1">
-            <a:tint val="60000"/>
-            <a:hueOff val="0"/>
-            <a:satOff val="0"/>
-            <a:lumOff val="0"/>
-            <a:alphaOff val="0"/>
-          </a:schemeClr>
-        </a:solidFill>
-        <a:ln>
-          <a:noFill/>
-        </a:ln>
-        <a:effectLst/>
-      </dsp:spPr>
-      <dsp:style>
-        <a:lnRef idx="0">
-          <a:scrgbClr r="0" g="0" b="0"/>
-        </a:lnRef>
-        <a:fillRef idx="1">
-          <a:scrgbClr r="0" g="0" b="0"/>
-        </a:fillRef>
-        <a:effectRef idx="0">
-          <a:scrgbClr r="0" g="0" b="0"/>
-        </a:effectRef>
-        <a:fontRef idx="minor">
-          <a:schemeClr val="lt1"/>
-        </a:fontRef>
-      </dsp:style>
-      <dsp:txBody>
-        <a:bodyPr spcFirstLastPara="0" vert="horz" wrap="square" lIns="0" tIns="0" rIns="0" bIns="0" numCol="1" spcCol="1270" anchor="ctr" anchorCtr="0">
-          <a:noAutofit/>
-        </a:bodyPr>
-        <a:lstStyle/>
-        <a:p>
-          <a:pPr lvl="0" algn="ctr" defTabSz="711200">
-            <a:lnSpc>
-              <a:spcPct val="90000"/>
-            </a:lnSpc>
-            <a:spcBef>
-              <a:spcPct val="0"/>
-            </a:spcBef>
-            <a:spcAft>
-              <a:spcPct val="35000"/>
-            </a:spcAft>
-          </a:pPr>
-          <a:endParaRPr lang="es-PE" sz="1600" kern="1200" noProof="0"/>
-        </a:p>
-      </dsp:txBody>
-      <dsp:txXfrm>
-        <a:off x="2052131" y="1397577"/>
-        <a:ext cx="298957" cy="325808"/>
-      </dsp:txXfrm>
-    </dsp:sp>
-  </dsp:spTree>
-</dsp:drawing>
-</file>
-
-<file path=ppt/diagrams/drawing2.xml><?xml version="1.0" encoding="utf-8"?>
-<dsp:drawing xmlns:dgm="http://schemas.openxmlformats.org/drawingml/2006/diagram" xmlns:dsp="http://schemas.microsoft.com/office/drawing/2008/diagram" xmlns:a="http://schemas.openxmlformats.org/drawingml/2006/main">
-  <dsp:spTree>
-    <dsp:nvGrpSpPr>
-      <dsp:cNvPr id="0" name=""/>
-      <dsp:cNvGrpSpPr/>
-    </dsp:nvGrpSpPr>
-    <dsp:grpSpPr/>
   </dsp:spTree>
 </dsp:drawing>
 </file>
@@ -5873,7 +5551,7 @@
           <a:p>
             <a:fld id="{82731913-02B6-467D-B183-D787C0857BBF}" type="datetimeFigureOut">
               <a:rPr lang="es-PE" smtClean="0"/>
-              <a:t>13/06/2013</a:t>
+              <a:t>20/11/2013</a:t>
             </a:fld>
             <a:endParaRPr lang="es-PE"/>
           </a:p>
@@ -11099,7 +10777,7 @@
             <a:fld id="{807CB568-C05F-482F-9F26-AA302B8892DF}" type="datetimeFigureOut">
               <a:rPr lang="es-ES" smtClean="0"/>
               <a:pPr/>
-              <a:t>13/06/2013</a:t>
+              <a:t>20/11/2013</a:t>
             </a:fld>
             <a:endParaRPr lang="es-ES"/>
           </a:p>
@@ -11278,7 +10956,7 @@
             <a:fld id="{807CB568-C05F-482F-9F26-AA302B8892DF}" type="datetimeFigureOut">
               <a:rPr lang="es-ES" smtClean="0"/>
               <a:pPr/>
-              <a:t>13/06/2013</a:t>
+              <a:t>20/11/2013</a:t>
             </a:fld>
             <a:endParaRPr lang="es-ES"/>
           </a:p>
@@ -11467,7 +11145,7 @@
             <a:fld id="{807CB568-C05F-482F-9F26-AA302B8892DF}" type="datetimeFigureOut">
               <a:rPr lang="es-ES" smtClean="0"/>
               <a:pPr/>
-              <a:t>13/06/2013</a:t>
+              <a:t>20/11/2013</a:t>
             </a:fld>
             <a:endParaRPr lang="es-ES"/>
           </a:p>
@@ -11646,7 +11324,7 @@
             <a:fld id="{807CB568-C05F-482F-9F26-AA302B8892DF}" type="datetimeFigureOut">
               <a:rPr lang="es-ES" smtClean="0"/>
               <a:pPr/>
-              <a:t>13/06/2013</a:t>
+              <a:t>20/11/2013</a:t>
             </a:fld>
             <a:endParaRPr lang="es-ES"/>
           </a:p>
@@ -11901,7 +11579,7 @@
             <a:fld id="{807CB568-C05F-482F-9F26-AA302B8892DF}" type="datetimeFigureOut">
               <a:rPr lang="es-ES" smtClean="0"/>
               <a:pPr/>
-              <a:t>13/06/2013</a:t>
+              <a:t>20/11/2013</a:t>
             </a:fld>
             <a:endParaRPr lang="es-ES"/>
           </a:p>
@@ -12198,7 +11876,7 @@
             <a:fld id="{807CB568-C05F-482F-9F26-AA302B8892DF}" type="datetimeFigureOut">
               <a:rPr lang="es-ES" smtClean="0"/>
               <a:pPr/>
-              <a:t>13/06/2013</a:t>
+              <a:t>20/11/2013</a:t>
             </a:fld>
             <a:endParaRPr lang="es-ES"/>
           </a:p>
@@ -12629,7 +12307,7 @@
             <a:fld id="{807CB568-C05F-482F-9F26-AA302B8892DF}" type="datetimeFigureOut">
               <a:rPr lang="es-ES" smtClean="0"/>
               <a:pPr/>
-              <a:t>13/06/2013</a:t>
+              <a:t>20/11/2013</a:t>
             </a:fld>
             <a:endParaRPr lang="es-ES"/>
           </a:p>
@@ -12756,7 +12434,7 @@
             <a:fld id="{807CB568-C05F-482F-9F26-AA302B8892DF}" type="datetimeFigureOut">
               <a:rPr lang="es-ES" smtClean="0"/>
               <a:pPr/>
-              <a:t>13/06/2013</a:t>
+              <a:t>20/11/2013</a:t>
             </a:fld>
             <a:endParaRPr lang="es-ES"/>
           </a:p>
@@ -12860,7 +12538,7 @@
             <a:fld id="{807CB568-C05F-482F-9F26-AA302B8892DF}" type="datetimeFigureOut">
               <a:rPr lang="es-ES" smtClean="0"/>
               <a:pPr/>
-              <a:t>13/06/2013</a:t>
+              <a:t>20/11/2013</a:t>
             </a:fld>
             <a:endParaRPr lang="es-ES"/>
           </a:p>
@@ -13146,7 +12824,7 @@
             <a:fld id="{807CB568-C05F-482F-9F26-AA302B8892DF}" type="datetimeFigureOut">
               <a:rPr lang="es-ES" smtClean="0"/>
               <a:pPr/>
-              <a:t>13/06/2013</a:t>
+              <a:t>20/11/2013</a:t>
             </a:fld>
             <a:endParaRPr lang="es-ES"/>
           </a:p>
@@ -13415,7 +13093,7 @@
             <a:fld id="{807CB568-C05F-482F-9F26-AA302B8892DF}" type="datetimeFigureOut">
               <a:rPr lang="es-ES" smtClean="0"/>
               <a:pPr/>
-              <a:t>13/06/2013</a:t>
+              <a:t>20/11/2013</a:t>
             </a:fld>
             <a:endParaRPr lang="es-ES"/>
           </a:p>
@@ -13666,7 +13344,7 @@
             <a:fld id="{807CB568-C05F-482F-9F26-AA302B8892DF}" type="datetimeFigureOut">
               <a:rPr lang="es-ES" smtClean="0"/>
               <a:pPr/>
-              <a:t>13/06/2013</a:t>
+              <a:t>20/11/2013</a:t>
             </a:fld>
             <a:endParaRPr lang="es-ES"/>
           </a:p>
@@ -28497,23 +28175,15 @@
             </a:r>
             <a:r>
               <a:rPr lang="es-PE" sz="2400" dirty="0" smtClean="0"/>
-              <a:t>" y </a:t>
-            </a:r>
-            <a:r>
-              <a:rPr lang="es-PE" sz="2400" dirty="0"/>
-              <a:t> </a:t>
+              <a:t>" </a:t>
             </a:r>
             <a:r>
               <a:rPr lang="es-PE" sz="2400" dirty="0" smtClean="0"/>
-              <a:t>a una </a:t>
-            </a:r>
-            <a:r>
-              <a:rPr lang="es-PE" sz="2400" dirty="0"/>
-              <a:t>j</a:t>
+              <a:t>a la jerarquía </a:t>
             </a:r>
             <a:r>
               <a:rPr lang="es-PE" sz="2400" dirty="0" smtClean="0"/>
-              <a:t>erarquía de clases "</a:t>
+              <a:t>de clases "</a:t>
             </a:r>
             <a:r>
               <a:rPr lang="es-PE" sz="2400" dirty="0" err="1" smtClean="0"/>

</xml_diff>